<commit_message>
atualização final dos slides
</commit_message>
<xml_diff>
--- a/Slide-Apresentação/apresentação.pptx
+++ b/Slide-Apresentação/apresentação.pptx
@@ -269,7 +269,7 @@
           <a:p>
             <a:fld id="{B269FA84-0DD4-4E3F-818A-99C0F9056DA4}" type="datetimeFigureOut">
               <a:rPr lang="pt-BR" smtClean="0"/>
-              <a:t>04/09/2022</a:t>
+              <a:t>05/09/2022</a:t>
             </a:fld>
             <a:endParaRPr lang="pt-BR"/>
           </a:p>
@@ -467,7 +467,7 @@
           <a:p>
             <a:fld id="{B269FA84-0DD4-4E3F-818A-99C0F9056DA4}" type="datetimeFigureOut">
               <a:rPr lang="pt-BR" smtClean="0"/>
-              <a:t>04/09/2022</a:t>
+              <a:t>05/09/2022</a:t>
             </a:fld>
             <a:endParaRPr lang="pt-BR"/>
           </a:p>
@@ -675,7 +675,7 @@
           <a:p>
             <a:fld id="{B269FA84-0DD4-4E3F-818A-99C0F9056DA4}" type="datetimeFigureOut">
               <a:rPr lang="pt-BR" smtClean="0"/>
-              <a:t>04/09/2022</a:t>
+              <a:t>05/09/2022</a:t>
             </a:fld>
             <a:endParaRPr lang="pt-BR"/>
           </a:p>
@@ -873,7 +873,7 @@
           <a:p>
             <a:fld id="{B269FA84-0DD4-4E3F-818A-99C0F9056DA4}" type="datetimeFigureOut">
               <a:rPr lang="pt-BR" smtClean="0"/>
-              <a:t>04/09/2022</a:t>
+              <a:t>05/09/2022</a:t>
             </a:fld>
             <a:endParaRPr lang="pt-BR"/>
           </a:p>
@@ -1148,7 +1148,7 @@
           <a:p>
             <a:fld id="{B269FA84-0DD4-4E3F-818A-99C0F9056DA4}" type="datetimeFigureOut">
               <a:rPr lang="pt-BR" smtClean="0"/>
-              <a:t>04/09/2022</a:t>
+              <a:t>05/09/2022</a:t>
             </a:fld>
             <a:endParaRPr lang="pt-BR"/>
           </a:p>
@@ -1413,7 +1413,7 @@
           <a:p>
             <a:fld id="{B269FA84-0DD4-4E3F-818A-99C0F9056DA4}" type="datetimeFigureOut">
               <a:rPr lang="pt-BR" smtClean="0"/>
-              <a:t>04/09/2022</a:t>
+              <a:t>05/09/2022</a:t>
             </a:fld>
             <a:endParaRPr lang="pt-BR"/>
           </a:p>
@@ -1825,7 +1825,7 @@
           <a:p>
             <a:fld id="{B269FA84-0DD4-4E3F-818A-99C0F9056DA4}" type="datetimeFigureOut">
               <a:rPr lang="pt-BR" smtClean="0"/>
-              <a:t>04/09/2022</a:t>
+              <a:t>05/09/2022</a:t>
             </a:fld>
             <a:endParaRPr lang="pt-BR"/>
           </a:p>
@@ -1966,7 +1966,7 @@
           <a:p>
             <a:fld id="{B269FA84-0DD4-4E3F-818A-99C0F9056DA4}" type="datetimeFigureOut">
               <a:rPr lang="pt-BR" smtClean="0"/>
-              <a:t>04/09/2022</a:t>
+              <a:t>05/09/2022</a:t>
             </a:fld>
             <a:endParaRPr lang="pt-BR"/>
           </a:p>
@@ -2079,7 +2079,7 @@
           <a:p>
             <a:fld id="{B269FA84-0DD4-4E3F-818A-99C0F9056DA4}" type="datetimeFigureOut">
               <a:rPr lang="pt-BR" smtClean="0"/>
-              <a:t>04/09/2022</a:t>
+              <a:t>05/09/2022</a:t>
             </a:fld>
             <a:endParaRPr lang="pt-BR"/>
           </a:p>
@@ -2390,7 +2390,7 @@
           <a:p>
             <a:fld id="{B269FA84-0DD4-4E3F-818A-99C0F9056DA4}" type="datetimeFigureOut">
               <a:rPr lang="pt-BR" smtClean="0"/>
-              <a:t>04/09/2022</a:t>
+              <a:t>05/09/2022</a:t>
             </a:fld>
             <a:endParaRPr lang="pt-BR"/>
           </a:p>
@@ -2678,7 +2678,7 @@
           <a:p>
             <a:fld id="{B269FA84-0DD4-4E3F-818A-99C0F9056DA4}" type="datetimeFigureOut">
               <a:rPr lang="pt-BR" smtClean="0"/>
-              <a:t>04/09/2022</a:t>
+              <a:t>05/09/2022</a:t>
             </a:fld>
             <a:endParaRPr lang="pt-BR"/>
           </a:p>
@@ -2919,7 +2919,7 @@
           <a:p>
             <a:fld id="{B269FA84-0DD4-4E3F-818A-99C0F9056DA4}" type="datetimeFigureOut">
               <a:rPr lang="pt-BR" smtClean="0"/>
-              <a:t>04/09/2022</a:t>
+              <a:t>05/09/2022</a:t>
             </a:fld>
             <a:endParaRPr lang="pt-BR"/>
           </a:p>
@@ -4575,7 +4575,7 @@
         <p:spPr>
           <a:xfrm>
             <a:off x="473868" y="1317250"/>
-            <a:ext cx="11244263" cy="4247317"/>
+            <a:ext cx="11244263" cy="5078313"/>
           </a:xfrm>
           <a:prstGeom prst="rect">
             <a:avLst/>
@@ -4588,21 +4588,32 @@
           </a:bodyPr>
           <a:lstStyle/>
           <a:p>
+            <a:pPr algn="just"/>
+            <a:r>
+              <a:rPr lang="pt-BR" sz="1800" b="0" i="0" dirty="0">
+                <a:solidFill>
+                  <a:schemeClr val="bg1"/>
+                </a:solidFill>
+                <a:effectLst/>
+                <a:latin typeface="Arial" panose="020B0604020202020204" pitchFamily="34" charset="0"/>
+                <a:cs typeface="Arial" panose="020B0604020202020204" pitchFamily="34" charset="0"/>
+              </a:rPr>
+              <a:t>                         (Entender a safra é entender a interferência da natureza na sua bebida)</a:t>
+            </a:r>
+          </a:p>
+          <a:p>
             <a:pPr marL="285750" indent="-285750" algn="just">
               <a:buFont typeface="Arial" panose="020B0604020202020204" pitchFamily="34" charset="0"/>
               <a:buChar char="•"/>
             </a:pPr>
-            <a:r>
-              <a:rPr lang="pt-BR" sz="1800" b="0" i="0" dirty="0">
-                <a:solidFill>
-                  <a:schemeClr val="bg1"/>
-                </a:solidFill>
-                <a:effectLst/>
-                <a:latin typeface="Arial" panose="020B0604020202020204" pitchFamily="34" charset="0"/>
-                <a:cs typeface="Arial" panose="020B0604020202020204" pitchFamily="34" charset="0"/>
-              </a:rPr>
-              <a:t>O número de apreciadores de vinhos no Brasil cresceu de 22 milhões em 2010 para 39 milhões em 2020, Segundo dados da Wine Inteligence. </a:t>
-            </a:r>
+            <a:endParaRPr lang="pt-BR" sz="1800" b="0" i="0" dirty="0">
+              <a:solidFill>
+                <a:schemeClr val="bg1"/>
+              </a:solidFill>
+              <a:effectLst/>
+              <a:latin typeface="Arial" panose="020B0604020202020204" pitchFamily="34" charset="0"/>
+              <a:cs typeface="Arial" panose="020B0604020202020204" pitchFamily="34" charset="0"/>
+            </a:endParaRPr>
           </a:p>
           <a:p>
             <a:pPr marL="285750" indent="-285750" algn="just">
@@ -4631,10 +4642,14 @@
                 <a:latin typeface="Arial" panose="020B0604020202020204" pitchFamily="34" charset="0"/>
                 <a:cs typeface="Arial" panose="020B0604020202020204" pitchFamily="34" charset="0"/>
               </a:rPr>
-              <a:t>O Dado revela que o mercado de vinho brasileiro não é maduro, pois ainda há muito a ser desenvolvido e é um grande oceano de oportunidades e vem crescendo a cada dia.</a:t>
-            </a:r>
-          </a:p>
-          <a:p>
+              <a:t>O número de apreciadores de vinhos no Brasil cresceu de 22 milhões em 2010 para 39 milhões em 2020, Segundo dados da Wine Inteligence. </a:t>
+            </a:r>
+          </a:p>
+          <a:p>
+            <a:pPr marL="285750" indent="-285750" algn="just">
+              <a:buFont typeface="Arial" panose="020B0604020202020204" pitchFamily="34" charset="0"/>
+              <a:buChar char="•"/>
+            </a:pPr>
             <a:endParaRPr lang="pt-BR" dirty="0">
               <a:solidFill>
                 <a:schemeClr val="bg1"/>
@@ -4644,16 +4659,43 @@
             </a:endParaRPr>
           </a:p>
           <a:p>
-            <a:pPr algn="ctr"/>
-            <a:r>
-              <a:rPr lang="pt-BR" b="1" u="sng" dirty="0">
+            <a:pPr marL="285750" indent="-285750" algn="just">
+              <a:buFont typeface="Arial" panose="020B0604020202020204" pitchFamily="34" charset="0"/>
+              <a:buChar char="•"/>
+            </a:pPr>
+            <a:r>
+              <a:rPr lang="pt-BR" sz="1800" b="0" i="0" dirty="0">
                 <a:solidFill>
                   <a:schemeClr val="bg1"/>
                 </a:solidFill>
+                <a:effectLst/>
                 <a:latin typeface="Arial" panose="020B0604020202020204" pitchFamily="34" charset="0"/>
                 <a:cs typeface="Arial" panose="020B0604020202020204" pitchFamily="34" charset="0"/>
               </a:rPr>
-              <a:t>O QUE DEVEMOS LEVAR EM  CONSIDERAÇÃO?</a:t>
+              <a:t>O Dado revela que o mercado de vinho brasileiro não é maduro, pois ainda há muito a ser desenvolvido e é um grande oceano de oportunidades e vem crescendo a cada dia.</a:t>
+            </a:r>
+          </a:p>
+          <a:p>
+            <a:pPr algn="ctr"/>
+            <a:endParaRPr lang="pt-BR" dirty="0">
+              <a:solidFill>
+                <a:schemeClr val="bg1"/>
+              </a:solidFill>
+              <a:latin typeface="Arial" panose="020B0604020202020204" pitchFamily="34" charset="0"/>
+              <a:cs typeface="Arial" panose="020B0604020202020204" pitchFamily="34" charset="0"/>
+            </a:endParaRPr>
+          </a:p>
+          <a:p>
+            <a:pPr algn="ctr"/>
+            <a:r>
+              <a:rPr lang="pt-BR" b="1" u="sng" dirty="0">
+                <a:solidFill>
+                  <a:schemeClr val="bg1"/>
+                </a:solidFill>
+                <a:latin typeface="Arial" panose="020B0604020202020204" pitchFamily="34" charset="0"/>
+                <a:cs typeface="Arial" panose="020B0604020202020204" pitchFamily="34" charset="0"/>
+              </a:rPr>
+              <a:t>O QUE DEVEMOS LEVAR EM  CONSIDERAÇÃO? </a:t>
             </a:r>
           </a:p>
           <a:p>

</xml_diff>

<commit_message>
Mudança na ordem do matheus e gabriel
</commit_message>
<xml_diff>
--- a/Slide-Apresentação/apresentação.pptx
+++ b/Slide-Apresentação/apresentação.pptx
@@ -8,8 +8,8 @@
     <p:sldId id="256" r:id="rId2"/>
     <p:sldId id="257" r:id="rId3"/>
     <p:sldId id="259" r:id="rId4"/>
-    <p:sldId id="260" r:id="rId5"/>
-    <p:sldId id="258" r:id="rId6"/>
+    <p:sldId id="258" r:id="rId5"/>
+    <p:sldId id="260" r:id="rId6"/>
     <p:sldId id="261" r:id="rId7"/>
     <p:sldId id="262" r:id="rId8"/>
     <p:sldId id="263" r:id="rId9"/>
@@ -5215,52 +5215,51 @@
       </p:grpSpPr>
       <p:sp>
         <p:nvSpPr>
-          <p:cNvPr id="4" name="CaixaDeTexto 3">
-            <a:extLst>
-              <a:ext uri="{FF2B5EF4-FFF2-40B4-BE49-F238E27FC236}">
-                <a16:creationId xmlns:a16="http://schemas.microsoft.com/office/drawing/2014/main" id="{80C0202F-9684-80BC-BFED-09C4EE91D93B}"/>
-              </a:ext>
-            </a:extLst>
-          </p:cNvPr>
-          <p:cNvSpPr txBox="1"/>
-          <p:nvPr/>
-        </p:nvSpPr>
-        <p:spPr>
-          <a:xfrm>
-            <a:off x="630990" y="1252682"/>
-            <a:ext cx="11158540" cy="584775"/>
-          </a:xfrm>
-          <a:prstGeom prst="rect">
-            <a:avLst/>
-          </a:prstGeom>
-          <a:noFill/>
-        </p:spPr>
-        <p:txBody>
-          <a:bodyPr wrap="square">
-            <a:spAutoFit/>
+          <p:cNvPr id="2" name="Título 1">
+            <a:extLst>
+              <a:ext uri="{FF2B5EF4-FFF2-40B4-BE49-F238E27FC236}">
+                <a16:creationId xmlns:a16="http://schemas.microsoft.com/office/drawing/2014/main" id="{13C50674-E433-55C2-5D05-6A3A06370CE1}"/>
+              </a:ext>
+            </a:extLst>
+          </p:cNvPr>
+          <p:cNvSpPr>
+            <a:spLocks noGrp="1"/>
+          </p:cNvSpPr>
+          <p:nvPr>
+            <p:ph type="title"/>
+          </p:nvPr>
+        </p:nvSpPr>
+        <p:spPr>
+          <a:xfrm>
+            <a:off x="1412508" y="-60704"/>
+            <a:ext cx="10515600" cy="1325563"/>
+          </a:xfrm>
+        </p:spPr>
+        <p:txBody>
+          <a:bodyPr>
+            <a:normAutofit/>
           </a:bodyPr>
           <a:lstStyle/>
           <a:p>
-            <a:pPr algn="ctr"/>
-            <a:r>
-              <a:rPr lang="pt-BR" sz="1600" dirty="0">
+            <a:r>
+              <a:rPr lang="pt-BR" sz="2800" dirty="0">
                 <a:solidFill>
                   <a:schemeClr val="bg1"/>
                 </a:solidFill>
                 <a:latin typeface="Arial" panose="020B0604020202020204" pitchFamily="34" charset="0"/>
                 <a:cs typeface="Arial" panose="020B0604020202020204" pitchFamily="34" charset="0"/>
               </a:rPr>
-              <a:t>O projeto consiste em usar um sensor específico para o controle de temperatura e umidade chamado DHT–11, o sensor capta as temperaturas do ambiente e usa esses dados capturados para informar as temperaturas e umidades.</a:t>
+              <a:t>Seguindo alguns dados...</a:t>
             </a:r>
           </a:p>
         </p:txBody>
       </p:sp>
       <p:pic>
         <p:nvPicPr>
-          <p:cNvPr id="7" name="Imagem 6">
-            <a:extLst>
-              <a:ext uri="{FF2B5EF4-FFF2-40B4-BE49-F238E27FC236}">
-                <a16:creationId xmlns:a16="http://schemas.microsoft.com/office/drawing/2014/main" id="{716ECA15-A172-C219-77C3-E015EB435289}"/>
+          <p:cNvPr id="4" name="Imagem 3">
+            <a:extLst>
+              <a:ext uri="{FF2B5EF4-FFF2-40B4-BE49-F238E27FC236}">
+                <a16:creationId xmlns:a16="http://schemas.microsoft.com/office/drawing/2014/main" id="{97B702F9-CED3-07EC-2D9C-E493C5FEFF6B}"/>
               </a:ext>
             </a:extLst>
           </p:cNvPr>
@@ -5270,7 +5269,13 @@
           <p:nvPr/>
         </p:nvPicPr>
         <p:blipFill>
-          <a:blip r:embed="rId2"/>
+          <a:blip r:embed="rId2">
+            <a:extLst>
+              <a:ext uri="{28A0092B-C50C-407E-A947-70E740481C1C}">
+                <a14:useLocalDpi xmlns:a14="http://schemas.microsoft.com/office/drawing/2010/main" val="0"/>
+              </a:ext>
+            </a:extLst>
+          </a:blip>
           <a:stretch>
             <a:fillRect/>
           </a:stretch>
@@ -5278,60 +5283,19 @@
         <p:spPr>
           <a:xfrm>
             <a:off x="0" y="0"/>
-            <a:ext cx="1261981" cy="871804"/>
+            <a:ext cx="1261209" cy="869800"/>
           </a:xfrm>
           <a:prstGeom prst="rect">
             <a:avLst/>
           </a:prstGeom>
         </p:spPr>
       </p:pic>
-      <p:sp>
-        <p:nvSpPr>
-          <p:cNvPr id="8" name="CaixaDeTexto 7">
-            <a:extLst>
-              <a:ext uri="{FF2B5EF4-FFF2-40B4-BE49-F238E27FC236}">
-                <a16:creationId xmlns:a16="http://schemas.microsoft.com/office/drawing/2014/main" id="{7518A757-50F9-168B-C38A-D73182BEB43F}"/>
-              </a:ext>
-            </a:extLst>
-          </p:cNvPr>
-          <p:cNvSpPr txBox="1"/>
-          <p:nvPr/>
-        </p:nvSpPr>
-        <p:spPr>
-          <a:xfrm>
-            <a:off x="1449389" y="348584"/>
-            <a:ext cx="8186737" cy="523220"/>
-          </a:xfrm>
-          <a:prstGeom prst="rect">
-            <a:avLst/>
-          </a:prstGeom>
-          <a:noFill/>
-        </p:spPr>
-        <p:txBody>
-          <a:bodyPr wrap="square" rtlCol="0">
-            <a:spAutoFit/>
-          </a:bodyPr>
-          <a:lstStyle/>
-          <a:p>
-            <a:r>
-              <a:rPr lang="pt-BR" sz="2800" dirty="0">
-                <a:solidFill>
-                  <a:schemeClr val="bg1"/>
-                </a:solidFill>
-                <a:latin typeface="Arial" panose="020B0604020202020204" pitchFamily="34" charset="0"/>
-                <a:cs typeface="Arial" panose="020B0604020202020204" pitchFamily="34" charset="0"/>
-              </a:rPr>
-              <a:t>O Projeto da GODWINE</a:t>
-            </a:r>
-          </a:p>
-        </p:txBody>
-      </p:sp>
       <p:pic>
         <p:nvPicPr>
-          <p:cNvPr id="10" name="Imagem 9">
-            <a:extLst>
-              <a:ext uri="{FF2B5EF4-FFF2-40B4-BE49-F238E27FC236}">
-                <a16:creationId xmlns:a16="http://schemas.microsoft.com/office/drawing/2014/main" id="{249DD724-EFF8-8C73-D05D-5490420B9731}"/>
+          <p:cNvPr id="5" name="Imagem 4">
+            <a:extLst>
+              <a:ext uri="{FF2B5EF4-FFF2-40B4-BE49-F238E27FC236}">
+                <a16:creationId xmlns:a16="http://schemas.microsoft.com/office/drawing/2014/main" id="{A15FB67F-B697-E252-27EF-59337991C63C}"/>
               </a:ext>
             </a:extLst>
           </p:cNvPr>
@@ -5348,18 +5312,252 @@
         </p:blipFill>
         <p:spPr>
           <a:xfrm>
-            <a:off x="2057400" y="2104905"/>
-            <a:ext cx="8103803" cy="4552462"/>
+            <a:off x="469393" y="1485901"/>
+            <a:ext cx="6023907" cy="3542452"/>
           </a:xfrm>
           <a:prstGeom prst="rect">
             <a:avLst/>
           </a:prstGeom>
         </p:spPr>
       </p:pic>
+      <p:sp>
+        <p:nvSpPr>
+          <p:cNvPr id="6" name="CaixaDeTexto 5">
+            <a:extLst>
+              <a:ext uri="{FF2B5EF4-FFF2-40B4-BE49-F238E27FC236}">
+                <a16:creationId xmlns:a16="http://schemas.microsoft.com/office/drawing/2014/main" id="{5CE0FB7C-E92D-E033-E6B8-8256AC7845A3}"/>
+              </a:ext>
+            </a:extLst>
+          </p:cNvPr>
+          <p:cNvSpPr txBox="1"/>
+          <p:nvPr/>
+        </p:nvSpPr>
+        <p:spPr>
+          <a:xfrm>
+            <a:off x="0" y="5249395"/>
+            <a:ext cx="6698883" cy="738664"/>
+          </a:xfrm>
+          <a:prstGeom prst="rect">
+            <a:avLst/>
+          </a:prstGeom>
+          <a:noFill/>
+        </p:spPr>
+        <p:txBody>
+          <a:bodyPr wrap="square" rtlCol="0">
+            <a:spAutoFit/>
+          </a:bodyPr>
+          <a:lstStyle/>
+          <a:p>
+            <a:pPr algn="ctr"/>
+            <a:r>
+              <a:rPr lang="pt-BR" sz="1400" kern="1000" dirty="0">
+                <a:solidFill>
+                  <a:schemeClr val="bg1"/>
+                </a:solidFill>
+                <a:effectLst/>
+                <a:latin typeface="Arial" panose="020B0604020202020204" pitchFamily="34" charset="0"/>
+                <a:ea typeface="Calibri" panose="020F0502020204030204" pitchFamily="34" charset="0"/>
+              </a:rPr>
+              <a:t>De acordo com o gráfico podemos ver algumas temperaturas e umidades adequadas para tipos de vinhos diferentes, sendo assim, caso essas temperaturas não sejam atendidas os vinhos podem sofrer alterações. </a:t>
+            </a:r>
+            <a:endParaRPr lang="pt-BR" sz="1400" dirty="0">
+              <a:solidFill>
+                <a:schemeClr val="bg1"/>
+              </a:solidFill>
+            </a:endParaRPr>
+          </a:p>
+        </p:txBody>
+      </p:sp>
+      <p:pic>
+        <p:nvPicPr>
+          <p:cNvPr id="12" name="Imagem 11">
+            <a:extLst>
+              <a:ext uri="{FF2B5EF4-FFF2-40B4-BE49-F238E27FC236}">
+                <a16:creationId xmlns:a16="http://schemas.microsoft.com/office/drawing/2014/main" id="{C53AD512-D8E7-2779-D0F2-1DE06B4AD09E}"/>
+              </a:ext>
+            </a:extLst>
+          </p:cNvPr>
+          <p:cNvPicPr>
+            <a:picLocks noChangeAspect="1"/>
+          </p:cNvPicPr>
+          <p:nvPr/>
+        </p:nvPicPr>
+        <p:blipFill>
+          <a:blip r:embed="rId4"/>
+          <a:stretch>
+            <a:fillRect/>
+          </a:stretch>
+        </p:blipFill>
+        <p:spPr>
+          <a:xfrm>
+            <a:off x="7200800" y="1264859"/>
+            <a:ext cx="4019808" cy="2394122"/>
+          </a:xfrm>
+          <a:prstGeom prst="rect">
+            <a:avLst/>
+          </a:prstGeom>
+        </p:spPr>
+      </p:pic>
+      <p:pic>
+        <p:nvPicPr>
+          <p:cNvPr id="14" name="Imagem 13">
+            <a:extLst>
+              <a:ext uri="{FF2B5EF4-FFF2-40B4-BE49-F238E27FC236}">
+                <a16:creationId xmlns:a16="http://schemas.microsoft.com/office/drawing/2014/main" id="{EBC8DD97-FA14-5A08-EDFF-5E19A1C9EAB8}"/>
+              </a:ext>
+            </a:extLst>
+          </p:cNvPr>
+          <p:cNvPicPr>
+            <a:picLocks noChangeAspect="1"/>
+          </p:cNvPicPr>
+          <p:nvPr/>
+        </p:nvPicPr>
+        <p:blipFill>
+          <a:blip r:embed="rId5"/>
+          <a:stretch>
+            <a:fillRect/>
+          </a:stretch>
+        </p:blipFill>
+        <p:spPr>
+          <a:xfrm>
+            <a:off x="7200800" y="4059541"/>
+            <a:ext cx="4019808" cy="2459767"/>
+          </a:xfrm>
+          <a:prstGeom prst="rect">
+            <a:avLst/>
+          </a:prstGeom>
+        </p:spPr>
+      </p:pic>
+      <p:sp>
+        <p:nvSpPr>
+          <p:cNvPr id="16" name="CaixaDeTexto 15">
+            <a:extLst>
+              <a:ext uri="{FF2B5EF4-FFF2-40B4-BE49-F238E27FC236}">
+                <a16:creationId xmlns:a16="http://schemas.microsoft.com/office/drawing/2014/main" id="{6A0D0C2F-72B4-4757-2F06-EA4093482E8A}"/>
+              </a:ext>
+            </a:extLst>
+          </p:cNvPr>
+          <p:cNvSpPr txBox="1"/>
+          <p:nvPr/>
+        </p:nvSpPr>
+        <p:spPr>
+          <a:xfrm>
+            <a:off x="7461462" y="468092"/>
+            <a:ext cx="3498484" cy="646331"/>
+          </a:xfrm>
+          <a:prstGeom prst="rect">
+            <a:avLst/>
+          </a:prstGeom>
+          <a:noFill/>
+        </p:spPr>
+        <p:txBody>
+          <a:bodyPr wrap="square" rtlCol="0">
+            <a:spAutoFit/>
+          </a:bodyPr>
+          <a:lstStyle/>
+          <a:p>
+            <a:pPr algn="ctr"/>
+            <a:r>
+              <a:rPr lang="pt-BR" dirty="0">
+                <a:solidFill>
+                  <a:schemeClr val="bg1"/>
+                </a:solidFill>
+                <a:latin typeface="Arial" panose="020B0604020202020204" pitchFamily="34" charset="0"/>
+                <a:cs typeface="Arial" panose="020B0604020202020204" pitchFamily="34" charset="0"/>
+              </a:rPr>
+              <a:t>Supondo que o Lucro mensal do cliente será R$ : 5.000</a:t>
+            </a:r>
+          </a:p>
+        </p:txBody>
+      </p:sp>
+      <p:sp>
+        <p:nvSpPr>
+          <p:cNvPr id="17" name="CaixaDeTexto 16">
+            <a:extLst>
+              <a:ext uri="{FF2B5EF4-FFF2-40B4-BE49-F238E27FC236}">
+                <a16:creationId xmlns:a16="http://schemas.microsoft.com/office/drawing/2014/main" id="{C6797717-B9AD-B813-2FFD-5FAFB780CD9E}"/>
+              </a:ext>
+            </a:extLst>
+          </p:cNvPr>
+          <p:cNvSpPr txBox="1"/>
+          <p:nvPr/>
+        </p:nvSpPr>
+        <p:spPr>
+          <a:xfrm>
+            <a:off x="7681941" y="3655528"/>
+            <a:ext cx="3057525" cy="307777"/>
+          </a:xfrm>
+          <a:prstGeom prst="rect">
+            <a:avLst/>
+          </a:prstGeom>
+          <a:noFill/>
+        </p:spPr>
+        <p:txBody>
+          <a:bodyPr wrap="square" rtlCol="0">
+            <a:spAutoFit/>
+          </a:bodyPr>
+          <a:lstStyle/>
+          <a:p>
+            <a:pPr algn="ctr"/>
+            <a:r>
+              <a:rPr lang="pt-BR" sz="1400" b="1" dirty="0">
+                <a:solidFill>
+                  <a:schemeClr val="bg1"/>
+                </a:solidFill>
+                <a:latin typeface="Arial" panose="020B0604020202020204" pitchFamily="34" charset="0"/>
+                <a:cs typeface="Arial" panose="020B0604020202020204" pitchFamily="34" charset="0"/>
+              </a:rPr>
+              <a:t>Sem os nossos serviços</a:t>
+            </a:r>
+          </a:p>
+        </p:txBody>
+      </p:sp>
+      <p:sp>
+        <p:nvSpPr>
+          <p:cNvPr id="18" name="CaixaDeTexto 17">
+            <a:extLst>
+              <a:ext uri="{FF2B5EF4-FFF2-40B4-BE49-F238E27FC236}">
+                <a16:creationId xmlns:a16="http://schemas.microsoft.com/office/drawing/2014/main" id="{CD241F7F-68E7-6CDD-F605-A5B8673532FA}"/>
+              </a:ext>
+            </a:extLst>
+          </p:cNvPr>
+          <p:cNvSpPr txBox="1"/>
+          <p:nvPr/>
+        </p:nvSpPr>
+        <p:spPr>
+          <a:xfrm>
+            <a:off x="7803384" y="6519308"/>
+            <a:ext cx="2814638" cy="307777"/>
+          </a:xfrm>
+          <a:prstGeom prst="rect">
+            <a:avLst/>
+          </a:prstGeom>
+          <a:noFill/>
+        </p:spPr>
+        <p:txBody>
+          <a:bodyPr wrap="square" rtlCol="0">
+            <a:spAutoFit/>
+          </a:bodyPr>
+          <a:lstStyle/>
+          <a:p>
+            <a:pPr algn="ctr"/>
+            <a:r>
+              <a:rPr lang="pt-BR" sz="1400" b="1" dirty="0">
+                <a:solidFill>
+                  <a:schemeClr val="bg1"/>
+                </a:solidFill>
+                <a:latin typeface="Arial" panose="020B0604020202020204" pitchFamily="34" charset="0"/>
+                <a:cs typeface="Arial" panose="020B0604020202020204" pitchFamily="34" charset="0"/>
+              </a:rPr>
+              <a:t>Com os nossos serviços</a:t>
+            </a:r>
+          </a:p>
+        </p:txBody>
+      </p:sp>
     </p:spTree>
     <p:extLst>
       <p:ext uri="{BB962C8B-B14F-4D97-AF65-F5344CB8AC3E}">
-        <p14:creationId xmlns:p14="http://schemas.microsoft.com/office/powerpoint/2010/main" val="1385953477"/>
+        <p14:creationId xmlns:p14="http://schemas.microsoft.com/office/powerpoint/2010/main" val="3962630938"/>
       </p:ext>
     </p:extLst>
   </p:cSld>
@@ -5396,51 +5594,52 @@
       </p:grpSpPr>
       <p:sp>
         <p:nvSpPr>
-          <p:cNvPr id="2" name="Título 1">
-            <a:extLst>
-              <a:ext uri="{FF2B5EF4-FFF2-40B4-BE49-F238E27FC236}">
-                <a16:creationId xmlns:a16="http://schemas.microsoft.com/office/drawing/2014/main" id="{13C50674-E433-55C2-5D05-6A3A06370CE1}"/>
-              </a:ext>
-            </a:extLst>
-          </p:cNvPr>
-          <p:cNvSpPr>
-            <a:spLocks noGrp="1"/>
-          </p:cNvSpPr>
-          <p:nvPr>
-            <p:ph type="title"/>
-          </p:nvPr>
-        </p:nvSpPr>
-        <p:spPr>
-          <a:xfrm>
-            <a:off x="1412508" y="-60704"/>
-            <a:ext cx="10515600" cy="1325563"/>
-          </a:xfrm>
-        </p:spPr>
-        <p:txBody>
-          <a:bodyPr>
-            <a:normAutofit/>
+          <p:cNvPr id="4" name="CaixaDeTexto 3">
+            <a:extLst>
+              <a:ext uri="{FF2B5EF4-FFF2-40B4-BE49-F238E27FC236}">
+                <a16:creationId xmlns:a16="http://schemas.microsoft.com/office/drawing/2014/main" id="{80C0202F-9684-80BC-BFED-09C4EE91D93B}"/>
+              </a:ext>
+            </a:extLst>
+          </p:cNvPr>
+          <p:cNvSpPr txBox="1"/>
+          <p:nvPr/>
+        </p:nvSpPr>
+        <p:spPr>
+          <a:xfrm>
+            <a:off x="630990" y="1252682"/>
+            <a:ext cx="11158540" cy="584775"/>
+          </a:xfrm>
+          <a:prstGeom prst="rect">
+            <a:avLst/>
+          </a:prstGeom>
+          <a:noFill/>
+        </p:spPr>
+        <p:txBody>
+          <a:bodyPr wrap="square">
+            <a:spAutoFit/>
           </a:bodyPr>
           <a:lstStyle/>
           <a:p>
-            <a:r>
-              <a:rPr lang="pt-BR" sz="2800" dirty="0">
+            <a:pPr algn="ctr"/>
+            <a:r>
+              <a:rPr lang="pt-BR" sz="1600" dirty="0">
                 <a:solidFill>
                   <a:schemeClr val="bg1"/>
                 </a:solidFill>
                 <a:latin typeface="Arial" panose="020B0604020202020204" pitchFamily="34" charset="0"/>
                 <a:cs typeface="Arial" panose="020B0604020202020204" pitchFamily="34" charset="0"/>
               </a:rPr>
-              <a:t>Seguindo alguns dados...</a:t>
+              <a:t>O projeto consiste em usar um sensor específico para o controle de temperatura e umidade chamado DHT–11, o sensor capta as temperaturas do ambiente e usa esses dados capturados para informar as temperaturas e umidades.</a:t>
             </a:r>
           </a:p>
         </p:txBody>
       </p:sp>
       <p:pic>
         <p:nvPicPr>
-          <p:cNvPr id="4" name="Imagem 3">
-            <a:extLst>
-              <a:ext uri="{FF2B5EF4-FFF2-40B4-BE49-F238E27FC236}">
-                <a16:creationId xmlns:a16="http://schemas.microsoft.com/office/drawing/2014/main" id="{97B702F9-CED3-07EC-2D9C-E493C5FEFF6B}"/>
+          <p:cNvPr id="7" name="Imagem 6">
+            <a:extLst>
+              <a:ext uri="{FF2B5EF4-FFF2-40B4-BE49-F238E27FC236}">
+                <a16:creationId xmlns:a16="http://schemas.microsoft.com/office/drawing/2014/main" id="{716ECA15-A172-C219-77C3-E015EB435289}"/>
               </a:ext>
             </a:extLst>
           </p:cNvPr>
@@ -5450,13 +5649,7 @@
           <p:nvPr/>
         </p:nvPicPr>
         <p:blipFill>
-          <a:blip r:embed="rId2">
-            <a:extLst>
-              <a:ext uri="{28A0092B-C50C-407E-A947-70E740481C1C}">
-                <a14:useLocalDpi xmlns:a14="http://schemas.microsoft.com/office/drawing/2010/main" val="0"/>
-              </a:ext>
-            </a:extLst>
-          </a:blip>
+          <a:blip r:embed="rId2"/>
           <a:stretch>
             <a:fillRect/>
           </a:stretch>
@@ -5464,19 +5657,60 @@
         <p:spPr>
           <a:xfrm>
             <a:off x="0" y="0"/>
-            <a:ext cx="1261209" cy="869800"/>
+            <a:ext cx="1261981" cy="871804"/>
           </a:xfrm>
           <a:prstGeom prst="rect">
             <a:avLst/>
           </a:prstGeom>
         </p:spPr>
       </p:pic>
+      <p:sp>
+        <p:nvSpPr>
+          <p:cNvPr id="8" name="CaixaDeTexto 7">
+            <a:extLst>
+              <a:ext uri="{FF2B5EF4-FFF2-40B4-BE49-F238E27FC236}">
+                <a16:creationId xmlns:a16="http://schemas.microsoft.com/office/drawing/2014/main" id="{7518A757-50F9-168B-C38A-D73182BEB43F}"/>
+              </a:ext>
+            </a:extLst>
+          </p:cNvPr>
+          <p:cNvSpPr txBox="1"/>
+          <p:nvPr/>
+        </p:nvSpPr>
+        <p:spPr>
+          <a:xfrm>
+            <a:off x="1449389" y="348584"/>
+            <a:ext cx="8186737" cy="523220"/>
+          </a:xfrm>
+          <a:prstGeom prst="rect">
+            <a:avLst/>
+          </a:prstGeom>
+          <a:noFill/>
+        </p:spPr>
+        <p:txBody>
+          <a:bodyPr wrap="square" rtlCol="0">
+            <a:spAutoFit/>
+          </a:bodyPr>
+          <a:lstStyle/>
+          <a:p>
+            <a:r>
+              <a:rPr lang="pt-BR" sz="2800" dirty="0">
+                <a:solidFill>
+                  <a:schemeClr val="bg1"/>
+                </a:solidFill>
+                <a:latin typeface="Arial" panose="020B0604020202020204" pitchFamily="34" charset="0"/>
+                <a:cs typeface="Arial" panose="020B0604020202020204" pitchFamily="34" charset="0"/>
+              </a:rPr>
+              <a:t>O Projeto da GODWINE</a:t>
+            </a:r>
+          </a:p>
+        </p:txBody>
+      </p:sp>
       <p:pic>
         <p:nvPicPr>
-          <p:cNvPr id="5" name="Imagem 4">
-            <a:extLst>
-              <a:ext uri="{FF2B5EF4-FFF2-40B4-BE49-F238E27FC236}">
-                <a16:creationId xmlns:a16="http://schemas.microsoft.com/office/drawing/2014/main" id="{A15FB67F-B697-E252-27EF-59337991C63C}"/>
+          <p:cNvPr id="10" name="Imagem 9">
+            <a:extLst>
+              <a:ext uri="{FF2B5EF4-FFF2-40B4-BE49-F238E27FC236}">
+                <a16:creationId xmlns:a16="http://schemas.microsoft.com/office/drawing/2014/main" id="{249DD724-EFF8-8C73-D05D-5490420B9731}"/>
               </a:ext>
             </a:extLst>
           </p:cNvPr>
@@ -5493,252 +5727,18 @@
         </p:blipFill>
         <p:spPr>
           <a:xfrm>
-            <a:off x="469393" y="1485901"/>
-            <a:ext cx="6023907" cy="3542452"/>
+            <a:off x="2057400" y="2104905"/>
+            <a:ext cx="8103803" cy="4552462"/>
           </a:xfrm>
           <a:prstGeom prst="rect">
             <a:avLst/>
           </a:prstGeom>
         </p:spPr>
       </p:pic>
-      <p:sp>
-        <p:nvSpPr>
-          <p:cNvPr id="6" name="CaixaDeTexto 5">
-            <a:extLst>
-              <a:ext uri="{FF2B5EF4-FFF2-40B4-BE49-F238E27FC236}">
-                <a16:creationId xmlns:a16="http://schemas.microsoft.com/office/drawing/2014/main" id="{5CE0FB7C-E92D-E033-E6B8-8256AC7845A3}"/>
-              </a:ext>
-            </a:extLst>
-          </p:cNvPr>
-          <p:cNvSpPr txBox="1"/>
-          <p:nvPr/>
-        </p:nvSpPr>
-        <p:spPr>
-          <a:xfrm>
-            <a:off x="0" y="5249395"/>
-            <a:ext cx="6698883" cy="738664"/>
-          </a:xfrm>
-          <a:prstGeom prst="rect">
-            <a:avLst/>
-          </a:prstGeom>
-          <a:noFill/>
-        </p:spPr>
-        <p:txBody>
-          <a:bodyPr wrap="square" rtlCol="0">
-            <a:spAutoFit/>
-          </a:bodyPr>
-          <a:lstStyle/>
-          <a:p>
-            <a:pPr algn="ctr"/>
-            <a:r>
-              <a:rPr lang="pt-BR" sz="1400" kern="1000" dirty="0">
-                <a:solidFill>
-                  <a:schemeClr val="bg1"/>
-                </a:solidFill>
-                <a:effectLst/>
-                <a:latin typeface="Arial" panose="020B0604020202020204" pitchFamily="34" charset="0"/>
-                <a:ea typeface="Calibri" panose="020F0502020204030204" pitchFamily="34" charset="0"/>
-              </a:rPr>
-              <a:t>De acordo com o gráfico podemos ver algumas temperaturas e umidades adequadas para tipos de vinhos diferentes, sendo assim, caso essas temperaturas não sejam atendidas os vinhos podem sofrer alterações. </a:t>
-            </a:r>
-            <a:endParaRPr lang="pt-BR" sz="1400" dirty="0">
-              <a:solidFill>
-                <a:schemeClr val="bg1"/>
-              </a:solidFill>
-            </a:endParaRPr>
-          </a:p>
-        </p:txBody>
-      </p:sp>
-      <p:pic>
-        <p:nvPicPr>
-          <p:cNvPr id="12" name="Imagem 11">
-            <a:extLst>
-              <a:ext uri="{FF2B5EF4-FFF2-40B4-BE49-F238E27FC236}">
-                <a16:creationId xmlns:a16="http://schemas.microsoft.com/office/drawing/2014/main" id="{C53AD512-D8E7-2779-D0F2-1DE06B4AD09E}"/>
-              </a:ext>
-            </a:extLst>
-          </p:cNvPr>
-          <p:cNvPicPr>
-            <a:picLocks noChangeAspect="1"/>
-          </p:cNvPicPr>
-          <p:nvPr/>
-        </p:nvPicPr>
-        <p:blipFill>
-          <a:blip r:embed="rId4"/>
-          <a:stretch>
-            <a:fillRect/>
-          </a:stretch>
-        </p:blipFill>
-        <p:spPr>
-          <a:xfrm>
-            <a:off x="7200800" y="1264859"/>
-            <a:ext cx="4019808" cy="2394122"/>
-          </a:xfrm>
-          <a:prstGeom prst="rect">
-            <a:avLst/>
-          </a:prstGeom>
-        </p:spPr>
-      </p:pic>
-      <p:pic>
-        <p:nvPicPr>
-          <p:cNvPr id="14" name="Imagem 13">
-            <a:extLst>
-              <a:ext uri="{FF2B5EF4-FFF2-40B4-BE49-F238E27FC236}">
-                <a16:creationId xmlns:a16="http://schemas.microsoft.com/office/drawing/2014/main" id="{EBC8DD97-FA14-5A08-EDFF-5E19A1C9EAB8}"/>
-              </a:ext>
-            </a:extLst>
-          </p:cNvPr>
-          <p:cNvPicPr>
-            <a:picLocks noChangeAspect="1"/>
-          </p:cNvPicPr>
-          <p:nvPr/>
-        </p:nvPicPr>
-        <p:blipFill>
-          <a:blip r:embed="rId5"/>
-          <a:stretch>
-            <a:fillRect/>
-          </a:stretch>
-        </p:blipFill>
-        <p:spPr>
-          <a:xfrm>
-            <a:off x="7200800" y="4059541"/>
-            <a:ext cx="4019808" cy="2459767"/>
-          </a:xfrm>
-          <a:prstGeom prst="rect">
-            <a:avLst/>
-          </a:prstGeom>
-        </p:spPr>
-      </p:pic>
-      <p:sp>
-        <p:nvSpPr>
-          <p:cNvPr id="16" name="CaixaDeTexto 15">
-            <a:extLst>
-              <a:ext uri="{FF2B5EF4-FFF2-40B4-BE49-F238E27FC236}">
-                <a16:creationId xmlns:a16="http://schemas.microsoft.com/office/drawing/2014/main" id="{6A0D0C2F-72B4-4757-2F06-EA4093482E8A}"/>
-              </a:ext>
-            </a:extLst>
-          </p:cNvPr>
-          <p:cNvSpPr txBox="1"/>
-          <p:nvPr/>
-        </p:nvSpPr>
-        <p:spPr>
-          <a:xfrm>
-            <a:off x="7461462" y="468092"/>
-            <a:ext cx="3498484" cy="646331"/>
-          </a:xfrm>
-          <a:prstGeom prst="rect">
-            <a:avLst/>
-          </a:prstGeom>
-          <a:noFill/>
-        </p:spPr>
-        <p:txBody>
-          <a:bodyPr wrap="square" rtlCol="0">
-            <a:spAutoFit/>
-          </a:bodyPr>
-          <a:lstStyle/>
-          <a:p>
-            <a:pPr algn="ctr"/>
-            <a:r>
-              <a:rPr lang="pt-BR" dirty="0">
-                <a:solidFill>
-                  <a:schemeClr val="bg1"/>
-                </a:solidFill>
-                <a:latin typeface="Arial" panose="020B0604020202020204" pitchFamily="34" charset="0"/>
-                <a:cs typeface="Arial" panose="020B0604020202020204" pitchFamily="34" charset="0"/>
-              </a:rPr>
-              <a:t>Supondo que o Lucro mensal do cliente será R$ : 5.000</a:t>
-            </a:r>
-          </a:p>
-        </p:txBody>
-      </p:sp>
-      <p:sp>
-        <p:nvSpPr>
-          <p:cNvPr id="17" name="CaixaDeTexto 16">
-            <a:extLst>
-              <a:ext uri="{FF2B5EF4-FFF2-40B4-BE49-F238E27FC236}">
-                <a16:creationId xmlns:a16="http://schemas.microsoft.com/office/drawing/2014/main" id="{C6797717-B9AD-B813-2FFD-5FAFB780CD9E}"/>
-              </a:ext>
-            </a:extLst>
-          </p:cNvPr>
-          <p:cNvSpPr txBox="1"/>
-          <p:nvPr/>
-        </p:nvSpPr>
-        <p:spPr>
-          <a:xfrm>
-            <a:off x="7681941" y="3655528"/>
-            <a:ext cx="3057525" cy="307777"/>
-          </a:xfrm>
-          <a:prstGeom prst="rect">
-            <a:avLst/>
-          </a:prstGeom>
-          <a:noFill/>
-        </p:spPr>
-        <p:txBody>
-          <a:bodyPr wrap="square" rtlCol="0">
-            <a:spAutoFit/>
-          </a:bodyPr>
-          <a:lstStyle/>
-          <a:p>
-            <a:pPr algn="ctr"/>
-            <a:r>
-              <a:rPr lang="pt-BR" sz="1400" b="1" dirty="0">
-                <a:solidFill>
-                  <a:schemeClr val="bg1"/>
-                </a:solidFill>
-                <a:latin typeface="Arial" panose="020B0604020202020204" pitchFamily="34" charset="0"/>
-                <a:cs typeface="Arial" panose="020B0604020202020204" pitchFamily="34" charset="0"/>
-              </a:rPr>
-              <a:t>Sem os nossos serviços</a:t>
-            </a:r>
-          </a:p>
-        </p:txBody>
-      </p:sp>
-      <p:sp>
-        <p:nvSpPr>
-          <p:cNvPr id="18" name="CaixaDeTexto 17">
-            <a:extLst>
-              <a:ext uri="{FF2B5EF4-FFF2-40B4-BE49-F238E27FC236}">
-                <a16:creationId xmlns:a16="http://schemas.microsoft.com/office/drawing/2014/main" id="{CD241F7F-68E7-6CDD-F605-A5B8673532FA}"/>
-              </a:ext>
-            </a:extLst>
-          </p:cNvPr>
-          <p:cNvSpPr txBox="1"/>
-          <p:nvPr/>
-        </p:nvSpPr>
-        <p:spPr>
-          <a:xfrm>
-            <a:off x="7803384" y="6519308"/>
-            <a:ext cx="2814638" cy="307777"/>
-          </a:xfrm>
-          <a:prstGeom prst="rect">
-            <a:avLst/>
-          </a:prstGeom>
-          <a:noFill/>
-        </p:spPr>
-        <p:txBody>
-          <a:bodyPr wrap="square" rtlCol="0">
-            <a:spAutoFit/>
-          </a:bodyPr>
-          <a:lstStyle/>
-          <a:p>
-            <a:pPr algn="ctr"/>
-            <a:r>
-              <a:rPr lang="pt-BR" sz="1400" b="1" dirty="0">
-                <a:solidFill>
-                  <a:schemeClr val="bg1"/>
-                </a:solidFill>
-                <a:latin typeface="Arial" panose="020B0604020202020204" pitchFamily="34" charset="0"/>
-                <a:cs typeface="Arial" panose="020B0604020202020204" pitchFamily="34" charset="0"/>
-              </a:rPr>
-              <a:t>Com os nossos serviços</a:t>
-            </a:r>
-          </a:p>
-        </p:txBody>
-      </p:sp>
     </p:spTree>
     <p:extLst>
       <p:ext uri="{BB962C8B-B14F-4D97-AF65-F5344CB8AC3E}">
-        <p14:creationId xmlns:p14="http://schemas.microsoft.com/office/powerpoint/2010/main" val="3962630938"/>
+        <p14:creationId xmlns:p14="http://schemas.microsoft.com/office/powerpoint/2010/main" val="1385953477"/>
       </p:ext>
     </p:extLst>
   </p:cSld>

</xml_diff>

<commit_message>
modificações que fizemos antes da apresentação da sprint01
</commit_message>
<xml_diff>
--- a/Slide-Apresentação/apresentação.pptx
+++ b/Slide-Apresentação/apresentação.pptx
@@ -10,10 +10,10 @@
     <p:sldId id="259" r:id="rId4"/>
     <p:sldId id="258" r:id="rId5"/>
     <p:sldId id="260" r:id="rId6"/>
-    <p:sldId id="261" r:id="rId7"/>
-    <p:sldId id="262" r:id="rId8"/>
-    <p:sldId id="263" r:id="rId9"/>
-    <p:sldId id="264" r:id="rId10"/>
+    <p:sldId id="264" r:id="rId7"/>
+    <p:sldId id="261" r:id="rId8"/>
+    <p:sldId id="262" r:id="rId9"/>
+    <p:sldId id="263" r:id="rId10"/>
     <p:sldId id="265" r:id="rId11"/>
     <p:sldId id="266" r:id="rId12"/>
   </p:sldIdLst>
@@ -269,7 +269,7 @@
           <a:p>
             <a:fld id="{B269FA84-0DD4-4E3F-818A-99C0F9056DA4}" type="datetimeFigureOut">
               <a:rPr lang="pt-BR" smtClean="0"/>
-              <a:t>05/09/2022</a:t>
+              <a:t>06/09/2022</a:t>
             </a:fld>
             <a:endParaRPr lang="pt-BR"/>
           </a:p>
@@ -467,7 +467,7 @@
           <a:p>
             <a:fld id="{B269FA84-0DD4-4E3F-818A-99C0F9056DA4}" type="datetimeFigureOut">
               <a:rPr lang="pt-BR" smtClean="0"/>
-              <a:t>05/09/2022</a:t>
+              <a:t>06/09/2022</a:t>
             </a:fld>
             <a:endParaRPr lang="pt-BR"/>
           </a:p>
@@ -675,7 +675,7 @@
           <a:p>
             <a:fld id="{B269FA84-0DD4-4E3F-818A-99C0F9056DA4}" type="datetimeFigureOut">
               <a:rPr lang="pt-BR" smtClean="0"/>
-              <a:t>05/09/2022</a:t>
+              <a:t>06/09/2022</a:t>
             </a:fld>
             <a:endParaRPr lang="pt-BR"/>
           </a:p>
@@ -873,7 +873,7 @@
           <a:p>
             <a:fld id="{B269FA84-0DD4-4E3F-818A-99C0F9056DA4}" type="datetimeFigureOut">
               <a:rPr lang="pt-BR" smtClean="0"/>
-              <a:t>05/09/2022</a:t>
+              <a:t>06/09/2022</a:t>
             </a:fld>
             <a:endParaRPr lang="pt-BR"/>
           </a:p>
@@ -1148,7 +1148,7 @@
           <a:p>
             <a:fld id="{B269FA84-0DD4-4E3F-818A-99C0F9056DA4}" type="datetimeFigureOut">
               <a:rPr lang="pt-BR" smtClean="0"/>
-              <a:t>05/09/2022</a:t>
+              <a:t>06/09/2022</a:t>
             </a:fld>
             <a:endParaRPr lang="pt-BR"/>
           </a:p>
@@ -1413,7 +1413,7 @@
           <a:p>
             <a:fld id="{B269FA84-0DD4-4E3F-818A-99C0F9056DA4}" type="datetimeFigureOut">
               <a:rPr lang="pt-BR" smtClean="0"/>
-              <a:t>05/09/2022</a:t>
+              <a:t>06/09/2022</a:t>
             </a:fld>
             <a:endParaRPr lang="pt-BR"/>
           </a:p>
@@ -1825,7 +1825,7 @@
           <a:p>
             <a:fld id="{B269FA84-0DD4-4E3F-818A-99C0F9056DA4}" type="datetimeFigureOut">
               <a:rPr lang="pt-BR" smtClean="0"/>
-              <a:t>05/09/2022</a:t>
+              <a:t>06/09/2022</a:t>
             </a:fld>
             <a:endParaRPr lang="pt-BR"/>
           </a:p>
@@ -1966,7 +1966,7 @@
           <a:p>
             <a:fld id="{B269FA84-0DD4-4E3F-818A-99C0F9056DA4}" type="datetimeFigureOut">
               <a:rPr lang="pt-BR" smtClean="0"/>
-              <a:t>05/09/2022</a:t>
+              <a:t>06/09/2022</a:t>
             </a:fld>
             <a:endParaRPr lang="pt-BR"/>
           </a:p>
@@ -2079,7 +2079,7 @@
           <a:p>
             <a:fld id="{B269FA84-0DD4-4E3F-818A-99C0F9056DA4}" type="datetimeFigureOut">
               <a:rPr lang="pt-BR" smtClean="0"/>
-              <a:t>05/09/2022</a:t>
+              <a:t>06/09/2022</a:t>
             </a:fld>
             <a:endParaRPr lang="pt-BR"/>
           </a:p>
@@ -2390,7 +2390,7 @@
           <a:p>
             <a:fld id="{B269FA84-0DD4-4E3F-818A-99C0F9056DA4}" type="datetimeFigureOut">
               <a:rPr lang="pt-BR" smtClean="0"/>
-              <a:t>05/09/2022</a:t>
+              <a:t>06/09/2022</a:t>
             </a:fld>
             <a:endParaRPr lang="pt-BR"/>
           </a:p>
@@ -2678,7 +2678,7 @@
           <a:p>
             <a:fld id="{B269FA84-0DD4-4E3F-818A-99C0F9056DA4}" type="datetimeFigureOut">
               <a:rPr lang="pt-BR" smtClean="0"/>
-              <a:t>05/09/2022</a:t>
+              <a:t>06/09/2022</a:t>
             </a:fld>
             <a:endParaRPr lang="pt-BR"/>
           </a:p>
@@ -2919,7 +2919,7 @@
           <a:p>
             <a:fld id="{B269FA84-0DD4-4E3F-818A-99C0F9056DA4}" type="datetimeFigureOut">
               <a:rPr lang="pt-BR" smtClean="0"/>
-              <a:t>05/09/2022</a:t>
+              <a:t>06/09/2022</a:t>
             </a:fld>
             <a:endParaRPr lang="pt-BR"/>
           </a:p>
@@ -3986,8 +3986,8 @@
         </p:nvSpPr>
         <p:spPr>
           <a:xfrm>
-            <a:off x="6542714" y="2968875"/>
-            <a:ext cx="3802743" cy="923330"/>
+            <a:off x="6718883" y="2742372"/>
+            <a:ext cx="3802743" cy="1754326"/>
           </a:xfrm>
           <a:prstGeom prst="rect">
             <a:avLst/>
@@ -4013,6 +4013,51 @@
                 <a:cs typeface="Arial" panose="020B0604020202020204" pitchFamily="34" charset="0"/>
               </a:rPr>
               <a:t>Código de funcionamento do Sensor DHT11 na placa Arduino.</a:t>
+            </a:r>
+          </a:p>
+          <a:p>
+            <a:pPr marL="285750" indent="-285750" algn="ctr">
+              <a:buFont typeface="Arial" panose="020B0604020202020204" pitchFamily="34" charset="0"/>
+              <a:buChar char="•"/>
+            </a:pPr>
+            <a:endParaRPr lang="pt-BR" b="1" dirty="0">
+              <a:solidFill>
+                <a:schemeClr val="bg1"/>
+              </a:solidFill>
+              <a:latin typeface="Arial" panose="020B0604020202020204" pitchFamily="34" charset="0"/>
+              <a:cs typeface="Arial" panose="020B0604020202020204" pitchFamily="34" charset="0"/>
+            </a:endParaRPr>
+          </a:p>
+          <a:p>
+            <a:pPr marL="285750" indent="-285750" algn="ctr">
+              <a:buFont typeface="Arial" panose="020B0604020202020204" pitchFamily="34" charset="0"/>
+              <a:buChar char="•"/>
+            </a:pPr>
+            <a:r>
+              <a:rPr lang="pt-BR" b="1" dirty="0">
+                <a:solidFill>
+                  <a:schemeClr val="bg1"/>
+                </a:solidFill>
+                <a:latin typeface="Arial" panose="020B0604020202020204" pitchFamily="34" charset="0"/>
+                <a:cs typeface="Arial" panose="020B0604020202020204" pitchFamily="34" charset="0"/>
+              </a:rPr>
+              <a:t>10 – 90% Umidade</a:t>
+            </a:r>
+          </a:p>
+          <a:p>
+            <a:pPr marL="285750" indent="-285750" algn="ctr">
+              <a:buFont typeface="Arial" panose="020B0604020202020204" pitchFamily="34" charset="0"/>
+              <a:buChar char="•"/>
+            </a:pPr>
+            <a:r>
+              <a:rPr lang="pt-BR" b="1" dirty="0">
+                <a:solidFill>
+                  <a:schemeClr val="bg1"/>
+                </a:solidFill>
+                <a:latin typeface="Arial" panose="020B0604020202020204" pitchFamily="34" charset="0"/>
+                <a:cs typeface="Arial" panose="020B0604020202020204" pitchFamily="34" charset="0"/>
+              </a:rPr>
+              <a:t>0 – 50 ºC Temperatura</a:t>
             </a:r>
           </a:p>
         </p:txBody>
@@ -4317,7 +4362,7 @@
                 <a:latin typeface="Arial" panose="020B0604020202020204" pitchFamily="34" charset="0"/>
                 <a:cs typeface="Arial" panose="020B0604020202020204" pitchFamily="34" charset="0"/>
               </a:rPr>
-              <a:t>Concluímos que os nossos sensores foram implantados com o proposito de ajudar as vinícolas a terem um desempenho melhor no mercado consumidor, sendo assim nosso trabalho é certificar um bom armazenamento dos vinhos, resultando um rendimento bem maior de produto e lucro. </a:t>
+              <a:t>Concluímos que os nossos sensores foram implantados com o proposito de ajudar as vinícolas a terem um desempenho melhor no mercado consumidor, sendo assim nosso trabalho é certificar um bom armazenamento dos vinhos, resultando um rendimento maior de produto e receita. </a:t>
             </a:r>
           </a:p>
         </p:txBody>
@@ -5382,16 +5427,15 @@
           </p:cNvPicPr>
           <p:nvPr/>
         </p:nvPicPr>
-        <p:blipFill>
+        <p:blipFill rotWithShape="1">
           <a:blip r:embed="rId4"/>
-          <a:stretch>
-            <a:fillRect/>
-          </a:stretch>
+          <a:srcRect t="72"/>
+          <a:stretch/>
         </p:blipFill>
         <p:spPr>
           <a:xfrm>
             <a:off x="7200800" y="1264859"/>
-            <a:ext cx="4019808" cy="2394122"/>
+            <a:ext cx="4019808" cy="2392396"/>
           </a:xfrm>
           <a:prstGeom prst="rect">
             <a:avLst/>
@@ -5465,7 +5509,7 @@
                 <a:latin typeface="Arial" panose="020B0604020202020204" pitchFamily="34" charset="0"/>
                 <a:cs typeface="Arial" panose="020B0604020202020204" pitchFamily="34" charset="0"/>
               </a:rPr>
-              <a:t>Supondo que o Lucro mensal do cliente será R$ : 5.000</a:t>
+              <a:t>Supondo que o receita mensal do cliente será R$ : 5.000</a:t>
             </a:r>
           </a:p>
         </p:txBody>
@@ -5550,6 +5594,246 @@
                 <a:cs typeface="Arial" panose="020B0604020202020204" pitchFamily="34" charset="0"/>
               </a:rPr>
               <a:t>Com os nossos serviços</a:t>
+            </a:r>
+          </a:p>
+        </p:txBody>
+      </p:sp>
+      <p:sp>
+        <p:nvSpPr>
+          <p:cNvPr id="7" name="Retângulo 6">
+            <a:extLst>
+              <a:ext uri="{FF2B5EF4-FFF2-40B4-BE49-F238E27FC236}">
+                <a16:creationId xmlns:a16="http://schemas.microsoft.com/office/drawing/2014/main" id="{210071E5-28C0-F1E8-9BCA-DF14CECAE6B6}"/>
+              </a:ext>
+            </a:extLst>
+          </p:cNvPr>
+          <p:cNvSpPr/>
+          <p:nvPr/>
+        </p:nvSpPr>
+        <p:spPr>
+          <a:xfrm>
+            <a:off x="7681941" y="1264859"/>
+            <a:ext cx="3057525" cy="307777"/>
+          </a:xfrm>
+          <a:prstGeom prst="rect">
+            <a:avLst/>
+          </a:prstGeom>
+          <a:solidFill>
+            <a:srgbClr val="FFFFFF"/>
+          </a:solidFill>
+          <a:ln>
+            <a:noFill/>
+          </a:ln>
+        </p:spPr>
+        <p:style>
+          <a:lnRef idx="2">
+            <a:schemeClr val="accent1">
+              <a:shade val="50000"/>
+            </a:schemeClr>
+          </a:lnRef>
+          <a:fillRef idx="1">
+            <a:schemeClr val="accent1"/>
+          </a:fillRef>
+          <a:effectRef idx="0">
+            <a:schemeClr val="accent1"/>
+          </a:effectRef>
+          <a:fontRef idx="minor">
+            <a:schemeClr val="lt1"/>
+          </a:fontRef>
+        </p:style>
+        <p:txBody>
+          <a:bodyPr rtlCol="0" anchor="ctr"/>
+          <a:lstStyle/>
+          <a:p>
+            <a:pPr algn="ctr"/>
+            <a:endParaRPr lang="pt-BR" dirty="0"/>
+          </a:p>
+        </p:txBody>
+      </p:sp>
+      <p:sp>
+        <p:nvSpPr>
+          <p:cNvPr id="8" name="Retângulo 7">
+            <a:extLst>
+              <a:ext uri="{FF2B5EF4-FFF2-40B4-BE49-F238E27FC236}">
+                <a16:creationId xmlns:a16="http://schemas.microsoft.com/office/drawing/2014/main" id="{73E03E17-F3B2-3580-BC23-D18641A3A0BE}"/>
+              </a:ext>
+            </a:extLst>
+          </p:cNvPr>
+          <p:cNvSpPr/>
+          <p:nvPr/>
+        </p:nvSpPr>
+        <p:spPr>
+          <a:xfrm>
+            <a:off x="8456103" y="1516709"/>
+            <a:ext cx="1476462" cy="206363"/>
+          </a:xfrm>
+          <a:prstGeom prst="rect">
+            <a:avLst/>
+          </a:prstGeom>
+          <a:solidFill>
+            <a:srgbClr val="FFFFFF"/>
+          </a:solidFill>
+          <a:ln>
+            <a:noFill/>
+          </a:ln>
+        </p:spPr>
+        <p:style>
+          <a:lnRef idx="2">
+            <a:schemeClr val="accent1">
+              <a:shade val="50000"/>
+            </a:schemeClr>
+          </a:lnRef>
+          <a:fillRef idx="1">
+            <a:schemeClr val="accent1"/>
+          </a:fillRef>
+          <a:effectRef idx="0">
+            <a:schemeClr val="accent1"/>
+          </a:effectRef>
+          <a:fontRef idx="minor">
+            <a:schemeClr val="lt1"/>
+          </a:fontRef>
+        </p:style>
+        <p:txBody>
+          <a:bodyPr rtlCol="0" anchor="ctr"/>
+          <a:lstStyle/>
+          <a:p>
+            <a:pPr algn="ctr"/>
+            <a:endParaRPr lang="pt-BR"/>
+          </a:p>
+        </p:txBody>
+      </p:sp>
+      <p:sp>
+        <p:nvSpPr>
+          <p:cNvPr id="9" name="CaixaDeTexto 8">
+            <a:extLst>
+              <a:ext uri="{FF2B5EF4-FFF2-40B4-BE49-F238E27FC236}">
+                <a16:creationId xmlns:a16="http://schemas.microsoft.com/office/drawing/2014/main" id="{79B6B361-00DA-F57E-B455-029A780AB61D}"/>
+              </a:ext>
+            </a:extLst>
+          </p:cNvPr>
+          <p:cNvSpPr txBox="1"/>
+          <p:nvPr/>
+        </p:nvSpPr>
+        <p:spPr>
+          <a:xfrm>
+            <a:off x="7797543" y="1267917"/>
+            <a:ext cx="2793582" cy="461665"/>
+          </a:xfrm>
+          <a:prstGeom prst="rect">
+            <a:avLst/>
+          </a:prstGeom>
+          <a:noFill/>
+        </p:spPr>
+        <p:txBody>
+          <a:bodyPr wrap="square" rtlCol="0">
+            <a:spAutoFit/>
+          </a:bodyPr>
+          <a:lstStyle/>
+          <a:p>
+            <a:pPr algn="ctr"/>
+            <a:r>
+              <a:rPr lang="pt-BR" sz="1200" dirty="0">
+                <a:solidFill>
+                  <a:srgbClr val="626262"/>
+                </a:solidFill>
+                <a:latin typeface="Arial" panose="020B0604020202020204" pitchFamily="34" charset="0"/>
+                <a:cs typeface="Arial" panose="020B0604020202020204" pitchFamily="34" charset="0"/>
+              </a:rPr>
+              <a:t>Percentual de dados relacionados a perda da receita da vinícola</a:t>
+            </a:r>
+          </a:p>
+        </p:txBody>
+      </p:sp>
+      <p:sp>
+        <p:nvSpPr>
+          <p:cNvPr id="10" name="Retângulo 9">
+            <a:extLst>
+              <a:ext uri="{FF2B5EF4-FFF2-40B4-BE49-F238E27FC236}">
+                <a16:creationId xmlns:a16="http://schemas.microsoft.com/office/drawing/2014/main" id="{0BD97C46-325B-0841-48A5-C926F5946608}"/>
+              </a:ext>
+            </a:extLst>
+          </p:cNvPr>
+          <p:cNvSpPr/>
+          <p:nvPr/>
+        </p:nvSpPr>
+        <p:spPr>
+          <a:xfrm>
+            <a:off x="7681941" y="4113741"/>
+            <a:ext cx="3278005" cy="407925"/>
+          </a:xfrm>
+          <a:prstGeom prst="rect">
+            <a:avLst/>
+          </a:prstGeom>
+          <a:solidFill>
+            <a:srgbClr val="FFFFFF"/>
+          </a:solidFill>
+          <a:ln>
+            <a:noFill/>
+          </a:ln>
+        </p:spPr>
+        <p:style>
+          <a:lnRef idx="2">
+            <a:schemeClr val="accent1">
+              <a:shade val="50000"/>
+            </a:schemeClr>
+          </a:lnRef>
+          <a:fillRef idx="1">
+            <a:schemeClr val="accent1"/>
+          </a:fillRef>
+          <a:effectRef idx="0">
+            <a:schemeClr val="accent1"/>
+          </a:effectRef>
+          <a:fontRef idx="minor">
+            <a:schemeClr val="lt1"/>
+          </a:fontRef>
+        </p:style>
+        <p:txBody>
+          <a:bodyPr rtlCol="0" anchor="ctr"/>
+          <a:lstStyle/>
+          <a:p>
+            <a:pPr algn="ctr"/>
+            <a:endParaRPr lang="pt-BR"/>
+          </a:p>
+        </p:txBody>
+      </p:sp>
+      <p:sp>
+        <p:nvSpPr>
+          <p:cNvPr id="13" name="CaixaDeTexto 12">
+            <a:extLst>
+              <a:ext uri="{FF2B5EF4-FFF2-40B4-BE49-F238E27FC236}">
+                <a16:creationId xmlns:a16="http://schemas.microsoft.com/office/drawing/2014/main" id="{750107E3-79D7-DCFE-50EA-08086F03B314}"/>
+              </a:ext>
+            </a:extLst>
+          </p:cNvPr>
+          <p:cNvSpPr txBox="1"/>
+          <p:nvPr/>
+        </p:nvSpPr>
+        <p:spPr>
+          <a:xfrm>
+            <a:off x="7797543" y="4060001"/>
+            <a:ext cx="2793582" cy="461665"/>
+          </a:xfrm>
+          <a:prstGeom prst="rect">
+            <a:avLst/>
+          </a:prstGeom>
+          <a:noFill/>
+        </p:spPr>
+        <p:txBody>
+          <a:bodyPr wrap="square" rtlCol="0">
+            <a:spAutoFit/>
+          </a:bodyPr>
+          <a:lstStyle/>
+          <a:p>
+            <a:pPr algn="ctr"/>
+            <a:r>
+              <a:rPr lang="pt-BR" sz="1200" dirty="0">
+                <a:solidFill>
+                  <a:srgbClr val="626262"/>
+                </a:solidFill>
+                <a:latin typeface="Arial" panose="020B0604020202020204" pitchFamily="34" charset="0"/>
+                <a:cs typeface="Arial" panose="020B0604020202020204" pitchFamily="34" charset="0"/>
+              </a:rPr>
+              <a:t>Percentual de dados relacionados a perda da receita da vinícola</a:t>
             </a:r>
           </a:p>
         </p:txBody>
@@ -5778,7 +6062,7 @@
           <p:cNvPr id="2" name="Título 1">
             <a:extLst>
               <a:ext uri="{FF2B5EF4-FFF2-40B4-BE49-F238E27FC236}">
-                <a16:creationId xmlns:a16="http://schemas.microsoft.com/office/drawing/2014/main" id="{601785AF-38CA-89C1-05A8-493AB0FF9FE4}"/>
+                <a16:creationId xmlns:a16="http://schemas.microsoft.com/office/drawing/2014/main" id="{5C61AC1E-8DB4-AB30-A458-4ACB217E7373}"/>
               </a:ext>
             </a:extLst>
           </p:cNvPr>
@@ -5791,8 +6075,8 @@
         </p:nvSpPr>
         <p:spPr>
           <a:xfrm>
-            <a:off x="1469473" y="0"/>
-            <a:ext cx="6284016" cy="1325563"/>
+            <a:off x="1538287" y="0"/>
+            <a:ext cx="10515600" cy="1325563"/>
           </a:xfrm>
         </p:spPr>
         <p:txBody>
@@ -5809,7 +6093,7 @@
                 <a:latin typeface="Arial" panose="020B0604020202020204" pitchFamily="34" charset="0"/>
                 <a:cs typeface="Arial" panose="020B0604020202020204" pitchFamily="34" charset="0"/>
               </a:rPr>
-              <a:t>Ferramenta de gestão</a:t>
+              <a:t>Banco de Dados</a:t>
             </a:r>
           </a:p>
         </p:txBody>
@@ -5819,7 +6103,7 @@
           <p:cNvPr id="4" name="Imagem 3">
             <a:extLst>
               <a:ext uri="{FF2B5EF4-FFF2-40B4-BE49-F238E27FC236}">
-                <a16:creationId xmlns:a16="http://schemas.microsoft.com/office/drawing/2014/main" id="{9DECA3DA-811C-4A86-DC58-23BC20EF452E}"/>
+                <a16:creationId xmlns:a16="http://schemas.microsoft.com/office/drawing/2014/main" id="{BE3F3652-96B1-ADCF-8406-2E3D8CB97E30}"/>
               </a:ext>
             </a:extLst>
           </p:cNvPr>
@@ -5849,7 +6133,7 @@
           <p:cNvPr id="5" name="CaixaDeTexto 4">
             <a:extLst>
               <a:ext uri="{FF2B5EF4-FFF2-40B4-BE49-F238E27FC236}">
-                <a16:creationId xmlns:a16="http://schemas.microsoft.com/office/drawing/2014/main" id="{7E4C1994-00A6-157C-EA9E-ED12AA50893C}"/>
+                <a16:creationId xmlns:a16="http://schemas.microsoft.com/office/drawing/2014/main" id="{57745C98-A0AA-C72B-65E6-4BE681D93CCB}"/>
               </a:ext>
             </a:extLst>
           </p:cNvPr>
@@ -5858,8 +6142,8 @@
         </p:nvSpPr>
         <p:spPr>
           <a:xfrm>
-            <a:off x="1356968" y="4469074"/>
-            <a:ext cx="3142008" cy="369332"/>
+            <a:off x="6096000" y="2921167"/>
+            <a:ext cx="4962526" cy="1015663"/>
           </a:xfrm>
           <a:prstGeom prst="rect">
             <a:avLst/>
@@ -5872,30 +6156,29 @@
           </a:bodyPr>
           <a:lstStyle/>
           <a:p>
-            <a:pPr marL="285750" indent="-285750">
+            <a:pPr marL="285750" indent="-285750" algn="ctr">
               <a:buFont typeface="Arial" panose="020B0604020202020204" pitchFamily="34" charset="0"/>
               <a:buChar char="•"/>
             </a:pPr>
             <a:r>
-              <a:rPr lang="pt-BR" sz="1800" b="1" u="sng" kern="1000" dirty="0">
+              <a:rPr lang="pt-BR" sz="2000" b="1" dirty="0">
                 <a:solidFill>
                   <a:schemeClr val="bg1"/>
                 </a:solidFill>
-                <a:effectLst/>
                 <a:latin typeface="Arial" panose="020B0604020202020204" pitchFamily="34" charset="0"/>
-                <a:ea typeface="Calibri" panose="020F0502020204030204" pitchFamily="34" charset="0"/>
+                <a:cs typeface="Arial" panose="020B0604020202020204" pitchFamily="34" charset="0"/>
               </a:rPr>
-              <a:t>MICROSOFT PLANNER </a:t>
+              <a:t>Tabelas (create table, inserts, selects) desenvolvidos no MySQL Workbench </a:t>
             </a:r>
           </a:p>
         </p:txBody>
       </p:sp>
       <p:pic>
         <p:nvPicPr>
-          <p:cNvPr id="8" name="Imagem 7">
-            <a:extLst>
-              <a:ext uri="{FF2B5EF4-FFF2-40B4-BE49-F238E27FC236}">
-                <a16:creationId xmlns:a16="http://schemas.microsoft.com/office/drawing/2014/main" id="{5B7D2274-B731-961C-C9BC-EB3033B37E6A}"/>
+          <p:cNvPr id="10" name="Imagem 9">
+            <a:extLst>
+              <a:ext uri="{FF2B5EF4-FFF2-40B4-BE49-F238E27FC236}">
+                <a16:creationId xmlns:a16="http://schemas.microsoft.com/office/drawing/2014/main" id="{6A4B1FE8-1457-2FEB-5E7D-C01642F5F46B}"/>
               </a:ext>
             </a:extLst>
           </p:cNvPr>
@@ -5912,38 +6195,8 @@
         </p:blipFill>
         <p:spPr>
           <a:xfrm>
-            <a:off x="1787525" y="2045785"/>
-            <a:ext cx="2347153" cy="2265816"/>
-          </a:xfrm>
-          <a:prstGeom prst="rect">
-            <a:avLst/>
-          </a:prstGeom>
-        </p:spPr>
-      </p:pic>
-      <p:pic>
-        <p:nvPicPr>
-          <p:cNvPr id="9" name="Imagem 8">
-            <a:extLst>
-              <a:ext uri="{FF2B5EF4-FFF2-40B4-BE49-F238E27FC236}">
-                <a16:creationId xmlns:a16="http://schemas.microsoft.com/office/drawing/2014/main" id="{0F47BEDC-579A-87CC-C523-F2B0F54778C5}"/>
-              </a:ext>
-            </a:extLst>
-          </p:cNvPr>
-          <p:cNvPicPr>
-            <a:picLocks noChangeAspect="1"/>
-          </p:cNvPicPr>
-          <p:nvPr/>
-        </p:nvPicPr>
-        <p:blipFill>
-          <a:blip r:embed="rId4"/>
-          <a:stretch>
-            <a:fillRect/>
-          </a:stretch>
-        </p:blipFill>
-        <p:spPr>
-          <a:xfrm>
-            <a:off x="6546575" y="2580999"/>
-            <a:ext cx="3666748" cy="1195387"/>
+            <a:off x="1247775" y="2026088"/>
+            <a:ext cx="4014812" cy="2676541"/>
           </a:xfrm>
           <a:prstGeom prst="rect">
             <a:avLst/>
@@ -5953,7 +6206,7 @@
     </p:spTree>
     <p:extLst>
       <p:ext uri="{BB962C8B-B14F-4D97-AF65-F5344CB8AC3E}">
-        <p14:creationId xmlns:p14="http://schemas.microsoft.com/office/powerpoint/2010/main" val="338880801"/>
+        <p14:creationId xmlns:p14="http://schemas.microsoft.com/office/powerpoint/2010/main" val="1732983272"/>
       </p:ext>
     </p:extLst>
   </p:cSld>
@@ -5993,7 +6246,7 @@
           <p:cNvPr id="2" name="Título 1">
             <a:extLst>
               <a:ext uri="{FF2B5EF4-FFF2-40B4-BE49-F238E27FC236}">
-                <a16:creationId xmlns:a16="http://schemas.microsoft.com/office/drawing/2014/main" id="{EC40BF27-98F3-EE9D-1C09-A9C475158FD5}"/>
+                <a16:creationId xmlns:a16="http://schemas.microsoft.com/office/drawing/2014/main" id="{601785AF-38CA-89C1-05A8-493AB0FF9FE4}"/>
               </a:ext>
             </a:extLst>
           </p:cNvPr>
@@ -6006,8 +6259,8 @@
         </p:nvSpPr>
         <p:spPr>
           <a:xfrm>
-            <a:off x="1452562" y="0"/>
-            <a:ext cx="10515600" cy="1325563"/>
+            <a:off x="1469473" y="0"/>
+            <a:ext cx="6284016" cy="1325563"/>
           </a:xfrm>
         </p:spPr>
         <p:txBody>
@@ -6024,7 +6277,7 @@
                 <a:latin typeface="Arial" panose="020B0604020202020204" pitchFamily="34" charset="0"/>
                 <a:cs typeface="Arial" panose="020B0604020202020204" pitchFamily="34" charset="0"/>
               </a:rPr>
-              <a:t>Protótipo do Site Institucional </a:t>
+              <a:t>Ferramenta de gestão</a:t>
             </a:r>
           </a:p>
         </p:txBody>
@@ -6034,7 +6287,7 @@
           <p:cNvPr id="4" name="Imagem 3">
             <a:extLst>
               <a:ext uri="{FF2B5EF4-FFF2-40B4-BE49-F238E27FC236}">
-                <a16:creationId xmlns:a16="http://schemas.microsoft.com/office/drawing/2014/main" id="{F803EB12-FE0C-E571-C5E9-C5EB1D2CED3A}"/>
+                <a16:creationId xmlns:a16="http://schemas.microsoft.com/office/drawing/2014/main" id="{9DECA3DA-811C-4A86-DC58-23BC20EF452E}"/>
               </a:ext>
             </a:extLst>
           </p:cNvPr>
@@ -6059,12 +6312,58 @@
           </a:prstGeom>
         </p:spPr>
       </p:pic>
+      <p:sp>
+        <p:nvSpPr>
+          <p:cNvPr id="5" name="CaixaDeTexto 4">
+            <a:extLst>
+              <a:ext uri="{FF2B5EF4-FFF2-40B4-BE49-F238E27FC236}">
+                <a16:creationId xmlns:a16="http://schemas.microsoft.com/office/drawing/2014/main" id="{7E4C1994-00A6-157C-EA9E-ED12AA50893C}"/>
+              </a:ext>
+            </a:extLst>
+          </p:cNvPr>
+          <p:cNvSpPr txBox="1"/>
+          <p:nvPr/>
+        </p:nvSpPr>
+        <p:spPr>
+          <a:xfrm>
+            <a:off x="1356968" y="4469074"/>
+            <a:ext cx="3142008" cy="369332"/>
+          </a:xfrm>
+          <a:prstGeom prst="rect">
+            <a:avLst/>
+          </a:prstGeom>
+          <a:noFill/>
+        </p:spPr>
+        <p:txBody>
+          <a:bodyPr wrap="square" rtlCol="0">
+            <a:spAutoFit/>
+          </a:bodyPr>
+          <a:lstStyle/>
+          <a:p>
+            <a:pPr marL="285750" indent="-285750">
+              <a:buFont typeface="Arial" panose="020B0604020202020204" pitchFamily="34" charset="0"/>
+              <a:buChar char="•"/>
+            </a:pPr>
+            <a:r>
+              <a:rPr lang="pt-BR" sz="1800" b="1" u="sng" kern="1000" dirty="0">
+                <a:solidFill>
+                  <a:schemeClr val="bg1"/>
+                </a:solidFill>
+                <a:effectLst/>
+                <a:latin typeface="Arial" panose="020B0604020202020204" pitchFamily="34" charset="0"/>
+                <a:ea typeface="Calibri" panose="020F0502020204030204" pitchFamily="34" charset="0"/>
+              </a:rPr>
+              <a:t>MICROSOFT PLANNER </a:t>
+            </a:r>
+          </a:p>
+        </p:txBody>
+      </p:sp>
       <p:pic>
         <p:nvPicPr>
-          <p:cNvPr id="5" name="Imagem 4">
-            <a:extLst>
-              <a:ext uri="{FF2B5EF4-FFF2-40B4-BE49-F238E27FC236}">
-                <a16:creationId xmlns:a16="http://schemas.microsoft.com/office/drawing/2014/main" id="{91323FD7-8AA5-0D4F-AFA7-67181669AC9C}"/>
+          <p:cNvPr id="8" name="Imagem 7">
+            <a:extLst>
+              <a:ext uri="{FF2B5EF4-FFF2-40B4-BE49-F238E27FC236}">
+                <a16:creationId xmlns:a16="http://schemas.microsoft.com/office/drawing/2014/main" id="{5B7D2274-B731-961C-C9BC-EB3033B37E6A}"/>
               </a:ext>
             </a:extLst>
           </p:cNvPr>
@@ -6081,63 +6380,48 @@
         </p:blipFill>
         <p:spPr>
           <a:xfrm>
-            <a:off x="1452562" y="1918252"/>
-            <a:ext cx="3657600" cy="3657600"/>
+            <a:off x="1787525" y="2045785"/>
+            <a:ext cx="2347153" cy="2265816"/>
           </a:xfrm>
           <a:prstGeom prst="rect">
             <a:avLst/>
           </a:prstGeom>
         </p:spPr>
       </p:pic>
-      <p:sp>
-        <p:nvSpPr>
-          <p:cNvPr id="6" name="CaixaDeTexto 5">
-            <a:extLst>
-              <a:ext uri="{FF2B5EF4-FFF2-40B4-BE49-F238E27FC236}">
-                <a16:creationId xmlns:a16="http://schemas.microsoft.com/office/drawing/2014/main" id="{E6D26252-1D36-92FB-B1DA-BBCE591AA6CE}"/>
-              </a:ext>
-            </a:extLst>
-          </p:cNvPr>
-          <p:cNvSpPr txBox="1"/>
+      <p:pic>
+        <p:nvPicPr>
+          <p:cNvPr id="9" name="Imagem 8">
+            <a:extLst>
+              <a:ext uri="{FF2B5EF4-FFF2-40B4-BE49-F238E27FC236}">
+                <a16:creationId xmlns:a16="http://schemas.microsoft.com/office/drawing/2014/main" id="{0F47BEDC-579A-87CC-C523-F2B0F54778C5}"/>
+              </a:ext>
+            </a:extLst>
+          </p:cNvPr>
+          <p:cNvPicPr>
+            <a:picLocks noChangeAspect="1"/>
+          </p:cNvPicPr>
           <p:nvPr/>
-        </p:nvSpPr>
-        <p:spPr>
-          <a:xfrm>
-            <a:off x="5954012" y="3039166"/>
-            <a:ext cx="4333460" cy="707886"/>
+        </p:nvPicPr>
+        <p:blipFill>
+          <a:blip r:embed="rId4"/>
+          <a:stretch>
+            <a:fillRect/>
+          </a:stretch>
+        </p:blipFill>
+        <p:spPr>
+          <a:xfrm>
+            <a:off x="6546575" y="2580999"/>
+            <a:ext cx="3666748" cy="1195387"/>
           </a:xfrm>
           <a:prstGeom prst="rect">
             <a:avLst/>
           </a:prstGeom>
-          <a:noFill/>
-        </p:spPr>
-        <p:txBody>
-          <a:bodyPr wrap="square" rtlCol="0">
-            <a:spAutoFit/>
-          </a:bodyPr>
-          <a:lstStyle/>
-          <a:p>
-            <a:pPr marL="285750" indent="-285750" algn="ctr">
-              <a:buFont typeface="Arial" panose="020B0604020202020204" pitchFamily="34" charset="0"/>
-              <a:buChar char="•"/>
-            </a:pPr>
-            <a:r>
-              <a:rPr lang="pt-BR" sz="2000" b="1" dirty="0">
-                <a:solidFill>
-                  <a:schemeClr val="bg1"/>
-                </a:solidFill>
-                <a:latin typeface="Arial" panose="020B0604020202020204" pitchFamily="34" charset="0"/>
-                <a:cs typeface="Arial" panose="020B0604020202020204" pitchFamily="34" charset="0"/>
-              </a:rPr>
-              <a:t>Ferramenta escolhida para o site é o FIGMA</a:t>
-            </a:r>
-          </a:p>
-        </p:txBody>
-      </p:sp>
+        </p:spPr>
+      </p:pic>
     </p:spTree>
     <p:extLst>
       <p:ext uri="{BB962C8B-B14F-4D97-AF65-F5344CB8AC3E}">
-        <p14:creationId xmlns:p14="http://schemas.microsoft.com/office/powerpoint/2010/main" val="1654482025"/>
+        <p14:creationId xmlns:p14="http://schemas.microsoft.com/office/powerpoint/2010/main" val="338880801"/>
       </p:ext>
     </p:extLst>
   </p:cSld>
@@ -6177,7 +6461,7 @@
           <p:cNvPr id="2" name="Título 1">
             <a:extLst>
               <a:ext uri="{FF2B5EF4-FFF2-40B4-BE49-F238E27FC236}">
-                <a16:creationId xmlns:a16="http://schemas.microsoft.com/office/drawing/2014/main" id="{8D29A098-2455-FC1D-28BF-B541D049BFBB}"/>
+                <a16:creationId xmlns:a16="http://schemas.microsoft.com/office/drawing/2014/main" id="{EC40BF27-98F3-EE9D-1C09-A9C475158FD5}"/>
               </a:ext>
             </a:extLst>
           </p:cNvPr>
@@ -6190,7 +6474,7 @@
         </p:nvSpPr>
         <p:spPr>
           <a:xfrm>
-            <a:off x="1447719" y="0"/>
+            <a:off x="1452562" y="0"/>
             <a:ext cx="10515600" cy="1325563"/>
           </a:xfrm>
         </p:spPr>
@@ -6208,7 +6492,7 @@
                 <a:latin typeface="Arial" panose="020B0604020202020204" pitchFamily="34" charset="0"/>
                 <a:cs typeface="Arial" panose="020B0604020202020204" pitchFamily="34" charset="0"/>
               </a:rPr>
-              <a:t>Simulador Financeiro</a:t>
+              <a:t>Protótipo do Site Institucional </a:t>
             </a:r>
           </a:p>
         </p:txBody>
@@ -6218,7 +6502,7 @@
           <p:cNvPr id="4" name="Imagem 3">
             <a:extLst>
               <a:ext uri="{FF2B5EF4-FFF2-40B4-BE49-F238E27FC236}">
-                <a16:creationId xmlns:a16="http://schemas.microsoft.com/office/drawing/2014/main" id="{CD0A6AAA-CAC7-C9A4-049F-A1AF74717481}"/>
+                <a16:creationId xmlns:a16="http://schemas.microsoft.com/office/drawing/2014/main" id="{F803EB12-FE0C-E571-C5E9-C5EB1D2CED3A}"/>
               </a:ext>
             </a:extLst>
           </p:cNvPr>
@@ -6243,57 +6527,12 @@
           </a:prstGeom>
         </p:spPr>
       </p:pic>
-      <p:sp>
-        <p:nvSpPr>
-          <p:cNvPr id="5" name="CaixaDeTexto 4">
-            <a:extLst>
-              <a:ext uri="{FF2B5EF4-FFF2-40B4-BE49-F238E27FC236}">
-                <a16:creationId xmlns:a16="http://schemas.microsoft.com/office/drawing/2014/main" id="{97CF45FD-1A9E-4AD7-5909-886FFCD26FDE}"/>
-              </a:ext>
-            </a:extLst>
-          </p:cNvPr>
-          <p:cNvSpPr txBox="1"/>
-          <p:nvPr/>
-        </p:nvSpPr>
-        <p:spPr>
-          <a:xfrm>
-            <a:off x="5951103" y="2431645"/>
-            <a:ext cx="4186238" cy="1015663"/>
-          </a:xfrm>
-          <a:prstGeom prst="rect">
-            <a:avLst/>
-          </a:prstGeom>
-          <a:noFill/>
-        </p:spPr>
-        <p:txBody>
-          <a:bodyPr wrap="square" rtlCol="0">
-            <a:spAutoFit/>
-          </a:bodyPr>
-          <a:lstStyle/>
-          <a:p>
-            <a:pPr marL="285750" indent="-285750" algn="ctr">
-              <a:buFont typeface="Arial" panose="020B0604020202020204" pitchFamily="34" charset="0"/>
-              <a:buChar char="•"/>
-            </a:pPr>
-            <a:r>
-              <a:rPr lang="pt-BR" sz="2000" b="1" dirty="0">
-                <a:solidFill>
-                  <a:schemeClr val="bg1"/>
-                </a:solidFill>
-                <a:latin typeface="Arial" panose="020B0604020202020204" pitchFamily="34" charset="0"/>
-                <a:cs typeface="Arial" panose="020B0604020202020204" pitchFamily="34" charset="0"/>
-              </a:rPr>
-              <a:t>Calculadora Financeira trabalhada no Visual Studio Code (VSCode)</a:t>
-            </a:r>
-          </a:p>
-        </p:txBody>
-      </p:sp>
       <p:pic>
         <p:nvPicPr>
-          <p:cNvPr id="6" name="Imagem 5">
-            <a:extLst>
-              <a:ext uri="{FF2B5EF4-FFF2-40B4-BE49-F238E27FC236}">
-                <a16:creationId xmlns:a16="http://schemas.microsoft.com/office/drawing/2014/main" id="{EAACE257-EEBD-20D9-F956-93E2868162E9}"/>
+          <p:cNvPr id="5" name="Imagem 4">
+            <a:extLst>
+              <a:ext uri="{FF2B5EF4-FFF2-40B4-BE49-F238E27FC236}">
+                <a16:creationId xmlns:a16="http://schemas.microsoft.com/office/drawing/2014/main" id="{91323FD7-8AA5-0D4F-AFA7-67181669AC9C}"/>
               </a:ext>
             </a:extLst>
           </p:cNvPr>
@@ -6310,96 +6549,63 @@
         </p:blipFill>
         <p:spPr>
           <a:xfrm>
-            <a:off x="1119062" y="1932949"/>
-            <a:ext cx="3028718" cy="3028718"/>
+            <a:off x="1452562" y="1918252"/>
+            <a:ext cx="3657600" cy="3657600"/>
           </a:xfrm>
           <a:prstGeom prst="rect">
             <a:avLst/>
           </a:prstGeom>
         </p:spPr>
       </p:pic>
-      <p:pic>
-        <p:nvPicPr>
-          <p:cNvPr id="14" name="Imagem 13">
-            <a:extLst>
-              <a:ext uri="{FF2B5EF4-FFF2-40B4-BE49-F238E27FC236}">
-                <a16:creationId xmlns:a16="http://schemas.microsoft.com/office/drawing/2014/main" id="{531A504B-C854-A8CE-2E6C-ECD8484D5273}"/>
-              </a:ext>
-            </a:extLst>
-          </p:cNvPr>
-          <p:cNvPicPr>
-            <a:picLocks noChangeAspect="1"/>
-          </p:cNvPicPr>
+      <p:sp>
+        <p:nvSpPr>
+          <p:cNvPr id="6" name="CaixaDeTexto 5">
+            <a:extLst>
+              <a:ext uri="{FF2B5EF4-FFF2-40B4-BE49-F238E27FC236}">
+                <a16:creationId xmlns:a16="http://schemas.microsoft.com/office/drawing/2014/main" id="{E6D26252-1D36-92FB-B1DA-BBCE591AA6CE}"/>
+              </a:ext>
+            </a:extLst>
+          </p:cNvPr>
+          <p:cNvSpPr txBox="1"/>
           <p:nvPr/>
-        </p:nvPicPr>
-        <p:blipFill>
-          <a:blip r:embed="rId4">
-            <a:extLst>
-              <a:ext uri="{28A0092B-C50C-407E-A947-70E740481C1C}">
-                <a14:useLocalDpi xmlns:a14="http://schemas.microsoft.com/office/drawing/2010/main" val="0"/>
-              </a:ext>
-            </a:extLst>
-          </a:blip>
-          <a:stretch>
-            <a:fillRect/>
-          </a:stretch>
-        </p:blipFill>
-        <p:spPr>
-          <a:xfrm>
-            <a:off x="7264207" y="4174047"/>
-            <a:ext cx="1805623" cy="1015663"/>
+        </p:nvSpPr>
+        <p:spPr>
+          <a:xfrm>
+            <a:off x="5954012" y="3039166"/>
+            <a:ext cx="4333460" cy="707886"/>
           </a:xfrm>
           <a:prstGeom prst="rect">
             <a:avLst/>
           </a:prstGeom>
-        </p:spPr>
-      </p:pic>
-      <p:cxnSp>
-        <p:nvCxnSpPr>
-          <p:cNvPr id="20" name="Conector: Angulado 19">
-            <a:extLst>
-              <a:ext uri="{FF2B5EF4-FFF2-40B4-BE49-F238E27FC236}">
-                <a16:creationId xmlns:a16="http://schemas.microsoft.com/office/drawing/2014/main" id="{4CBA7DA8-916E-0FA6-E89D-20D028B0595D}"/>
-              </a:ext>
-            </a:extLst>
-          </p:cNvPr>
-          <p:cNvCxnSpPr/>
-          <p:nvPr/>
-        </p:nvCxnSpPr>
-        <p:spPr>
-          <a:xfrm>
-            <a:off x="4557485" y="3761581"/>
-            <a:ext cx="1930400" cy="824933"/>
-          </a:xfrm>
-          <a:prstGeom prst="bentConnector3">
-            <a:avLst/>
-          </a:prstGeom>
-          <a:ln>
-            <a:solidFill>
-              <a:schemeClr val="bg1"/>
-            </a:solidFill>
-            <a:tailEnd type="triangle"/>
-          </a:ln>
-        </p:spPr>
-        <p:style>
-          <a:lnRef idx="1">
-            <a:schemeClr val="accent1"/>
-          </a:lnRef>
-          <a:fillRef idx="0">
-            <a:schemeClr val="accent1"/>
-          </a:fillRef>
-          <a:effectRef idx="0">
-            <a:schemeClr val="accent1"/>
-          </a:effectRef>
-          <a:fontRef idx="minor">
-            <a:schemeClr val="tx1"/>
-          </a:fontRef>
-        </p:style>
-      </p:cxnSp>
+          <a:noFill/>
+        </p:spPr>
+        <p:txBody>
+          <a:bodyPr wrap="square" rtlCol="0">
+            <a:spAutoFit/>
+          </a:bodyPr>
+          <a:lstStyle/>
+          <a:p>
+            <a:pPr marL="285750" indent="-285750" algn="ctr">
+              <a:buFont typeface="Arial" panose="020B0604020202020204" pitchFamily="34" charset="0"/>
+              <a:buChar char="•"/>
+            </a:pPr>
+            <a:r>
+              <a:rPr lang="pt-BR" sz="2000" b="1" dirty="0">
+                <a:solidFill>
+                  <a:schemeClr val="bg1"/>
+                </a:solidFill>
+                <a:latin typeface="Arial" panose="020B0604020202020204" pitchFamily="34" charset="0"/>
+                <a:cs typeface="Arial" panose="020B0604020202020204" pitchFamily="34" charset="0"/>
+              </a:rPr>
+              <a:t>Ferramenta escolhida para o site é o FIGMA</a:t>
+            </a:r>
+          </a:p>
+        </p:txBody>
+      </p:sp>
     </p:spTree>
     <p:extLst>
       <p:ext uri="{BB962C8B-B14F-4D97-AF65-F5344CB8AC3E}">
-        <p14:creationId xmlns:p14="http://schemas.microsoft.com/office/powerpoint/2010/main" val="4222254476"/>
+        <p14:creationId xmlns:p14="http://schemas.microsoft.com/office/powerpoint/2010/main" val="1654482025"/>
       </p:ext>
     </p:extLst>
   </p:cSld>
@@ -6439,7 +6645,7 @@
           <p:cNvPr id="2" name="Título 1">
             <a:extLst>
               <a:ext uri="{FF2B5EF4-FFF2-40B4-BE49-F238E27FC236}">
-                <a16:creationId xmlns:a16="http://schemas.microsoft.com/office/drawing/2014/main" id="{5C61AC1E-8DB4-AB30-A458-4ACB217E7373}"/>
+                <a16:creationId xmlns:a16="http://schemas.microsoft.com/office/drawing/2014/main" id="{8D29A098-2455-FC1D-28BF-B541D049BFBB}"/>
               </a:ext>
             </a:extLst>
           </p:cNvPr>
@@ -6452,7 +6658,7 @@
         </p:nvSpPr>
         <p:spPr>
           <a:xfrm>
-            <a:off x="1538287" y="0"/>
+            <a:off x="1447719" y="0"/>
             <a:ext cx="10515600" cy="1325563"/>
           </a:xfrm>
         </p:spPr>
@@ -6470,7 +6676,7 @@
                 <a:latin typeface="Arial" panose="020B0604020202020204" pitchFamily="34" charset="0"/>
                 <a:cs typeface="Arial" panose="020B0604020202020204" pitchFamily="34" charset="0"/>
               </a:rPr>
-              <a:t>Banco de Dados</a:t>
+              <a:t>Simulador Financeiro</a:t>
             </a:r>
           </a:p>
         </p:txBody>
@@ -6480,7 +6686,7 @@
           <p:cNvPr id="4" name="Imagem 3">
             <a:extLst>
               <a:ext uri="{FF2B5EF4-FFF2-40B4-BE49-F238E27FC236}">
-                <a16:creationId xmlns:a16="http://schemas.microsoft.com/office/drawing/2014/main" id="{BE3F3652-96B1-ADCF-8406-2E3D8CB97E30}"/>
+                <a16:creationId xmlns:a16="http://schemas.microsoft.com/office/drawing/2014/main" id="{CD0A6AAA-CAC7-C9A4-049F-A1AF74717481}"/>
               </a:ext>
             </a:extLst>
           </p:cNvPr>
@@ -6510,7 +6716,7 @@
           <p:cNvPr id="5" name="CaixaDeTexto 4">
             <a:extLst>
               <a:ext uri="{FF2B5EF4-FFF2-40B4-BE49-F238E27FC236}">
-                <a16:creationId xmlns:a16="http://schemas.microsoft.com/office/drawing/2014/main" id="{57745C98-A0AA-C72B-65E6-4BE681D93CCB}"/>
+                <a16:creationId xmlns:a16="http://schemas.microsoft.com/office/drawing/2014/main" id="{97CF45FD-1A9E-4AD7-5909-886FFCD26FDE}"/>
               </a:ext>
             </a:extLst>
           </p:cNvPr>
@@ -6519,8 +6725,8 @@
         </p:nvSpPr>
         <p:spPr>
           <a:xfrm>
-            <a:off x="6096000" y="2921167"/>
-            <a:ext cx="4962526" cy="1015663"/>
+            <a:off x="5951103" y="2431645"/>
+            <a:ext cx="4186238" cy="1015663"/>
           </a:xfrm>
           <a:prstGeom prst="rect">
             <a:avLst/>
@@ -6545,17 +6751,17 @@
                 <a:latin typeface="Arial" panose="020B0604020202020204" pitchFamily="34" charset="0"/>
                 <a:cs typeface="Arial" panose="020B0604020202020204" pitchFamily="34" charset="0"/>
               </a:rPr>
-              <a:t>Tabelas (create table, inserts, selects) desenvolvidos no MySQL Workbench </a:t>
+              <a:t>Calculadora Financeira trabalhada no Visual Studio Code (VSCode)</a:t>
             </a:r>
           </a:p>
         </p:txBody>
       </p:sp>
       <p:pic>
         <p:nvPicPr>
-          <p:cNvPr id="10" name="Imagem 9">
-            <a:extLst>
-              <a:ext uri="{FF2B5EF4-FFF2-40B4-BE49-F238E27FC236}">
-                <a16:creationId xmlns:a16="http://schemas.microsoft.com/office/drawing/2014/main" id="{6A4B1FE8-1457-2FEB-5E7D-C01642F5F46B}"/>
+          <p:cNvPr id="6" name="Imagem 5">
+            <a:extLst>
+              <a:ext uri="{FF2B5EF4-FFF2-40B4-BE49-F238E27FC236}">
+                <a16:creationId xmlns:a16="http://schemas.microsoft.com/office/drawing/2014/main" id="{EAACE257-EEBD-20D9-F956-93E2868162E9}"/>
               </a:ext>
             </a:extLst>
           </p:cNvPr>
@@ -6572,18 +6778,96 @@
         </p:blipFill>
         <p:spPr>
           <a:xfrm>
-            <a:off x="1247775" y="2026088"/>
-            <a:ext cx="4014812" cy="2676541"/>
+            <a:off x="1119062" y="1932949"/>
+            <a:ext cx="3028718" cy="3028718"/>
           </a:xfrm>
           <a:prstGeom prst="rect">
             <a:avLst/>
           </a:prstGeom>
         </p:spPr>
       </p:pic>
+      <p:pic>
+        <p:nvPicPr>
+          <p:cNvPr id="14" name="Imagem 13">
+            <a:extLst>
+              <a:ext uri="{FF2B5EF4-FFF2-40B4-BE49-F238E27FC236}">
+                <a16:creationId xmlns:a16="http://schemas.microsoft.com/office/drawing/2014/main" id="{531A504B-C854-A8CE-2E6C-ECD8484D5273}"/>
+              </a:ext>
+            </a:extLst>
+          </p:cNvPr>
+          <p:cNvPicPr>
+            <a:picLocks noChangeAspect="1"/>
+          </p:cNvPicPr>
+          <p:nvPr/>
+        </p:nvPicPr>
+        <p:blipFill>
+          <a:blip r:embed="rId4">
+            <a:extLst>
+              <a:ext uri="{28A0092B-C50C-407E-A947-70E740481C1C}">
+                <a14:useLocalDpi xmlns:a14="http://schemas.microsoft.com/office/drawing/2010/main" val="0"/>
+              </a:ext>
+            </a:extLst>
+          </a:blip>
+          <a:stretch>
+            <a:fillRect/>
+          </a:stretch>
+        </p:blipFill>
+        <p:spPr>
+          <a:xfrm>
+            <a:off x="7264207" y="4174047"/>
+            <a:ext cx="1805623" cy="1015663"/>
+          </a:xfrm>
+          <a:prstGeom prst="rect">
+            <a:avLst/>
+          </a:prstGeom>
+        </p:spPr>
+      </p:pic>
+      <p:cxnSp>
+        <p:nvCxnSpPr>
+          <p:cNvPr id="20" name="Conector: Angulado 19">
+            <a:extLst>
+              <a:ext uri="{FF2B5EF4-FFF2-40B4-BE49-F238E27FC236}">
+                <a16:creationId xmlns:a16="http://schemas.microsoft.com/office/drawing/2014/main" id="{4CBA7DA8-916E-0FA6-E89D-20D028B0595D}"/>
+              </a:ext>
+            </a:extLst>
+          </p:cNvPr>
+          <p:cNvCxnSpPr/>
+          <p:nvPr/>
+        </p:nvCxnSpPr>
+        <p:spPr>
+          <a:xfrm>
+            <a:off x="4557485" y="3761581"/>
+            <a:ext cx="1930400" cy="824933"/>
+          </a:xfrm>
+          <a:prstGeom prst="bentConnector3">
+            <a:avLst/>
+          </a:prstGeom>
+          <a:ln>
+            <a:solidFill>
+              <a:schemeClr val="bg1"/>
+            </a:solidFill>
+            <a:tailEnd type="triangle"/>
+          </a:ln>
+        </p:spPr>
+        <p:style>
+          <a:lnRef idx="1">
+            <a:schemeClr val="accent1"/>
+          </a:lnRef>
+          <a:fillRef idx="0">
+            <a:schemeClr val="accent1"/>
+          </a:fillRef>
+          <a:effectRef idx="0">
+            <a:schemeClr val="accent1"/>
+          </a:effectRef>
+          <a:fontRef idx="minor">
+            <a:schemeClr val="tx1"/>
+          </a:fontRef>
+        </p:style>
+      </p:cxnSp>
     </p:spTree>
     <p:extLst>
       <p:ext uri="{BB962C8B-B14F-4D97-AF65-F5344CB8AC3E}">
-        <p14:creationId xmlns:p14="http://schemas.microsoft.com/office/powerpoint/2010/main" val="1732983272"/>
+        <p14:creationId xmlns:p14="http://schemas.microsoft.com/office/powerpoint/2010/main" val="4222254476"/>
       </p:ext>
     </p:extLst>
   </p:cSld>

</xml_diff>